<commit_message>
#2 - discussion work
- redid the hubble diagram
- made a chi squared analysis program
- discussion on larger data set, moving onto bayesian statistics
</commit_message>
<xml_diff>
--- a/physics_problem_solving/report/results/results.pptx
+++ b/physics_problem_solving/report/results/results.pptx
@@ -3781,10 +3781,10 @@
       </p:grpSpPr>
       <p:pic>
         <p:nvPicPr>
-          <p:cNvPr id="8" name="Picture 7">
-            <a:extLst>
-              <a:ext uri="{FF2B5EF4-FFF2-40B4-BE49-F238E27FC236}">
-                <a16:creationId xmlns:a16="http://schemas.microsoft.com/office/drawing/2014/main" id="{4252EDE7-E427-2844-AF12-77DB02D8459E}"/>
+          <p:cNvPr id="35" name="Picture 34">
+            <a:extLst>
+              <a:ext uri="{FF2B5EF4-FFF2-40B4-BE49-F238E27FC236}">
+                <a16:creationId xmlns:a16="http://schemas.microsoft.com/office/drawing/2014/main" id="{690A6320-9EE7-C440-9BC2-A6E8FD664480}"/>
               </a:ext>
             </a:extLst>
           </p:cNvPr>
@@ -3794,901 +3794,20 @@
           <p:nvPr/>
         </p:nvPicPr>
         <p:blipFill rotWithShape="1">
-          <a:blip r:embed="rId3">
-            <a:extLst>
-              <a:ext uri="{28A0092B-C50C-407E-A947-70E740481C1C}">
-                <a14:useLocalDpi xmlns:a14="http://schemas.microsoft.com/office/drawing/2010/main" val="0"/>
-              </a:ext>
-            </a:extLst>
-          </a:blip>
-          <a:srcRect t="9912"/>
+          <a:blip r:embed="rId3"/>
+          <a:srcRect t="10426"/>
           <a:stretch/>
         </p:blipFill>
         <p:spPr>
           <a:xfrm>
-            <a:off x="5986183" y="1416050"/>
-            <a:ext cx="5854700" cy="3958666"/>
+            <a:off x="2956555" y="3406698"/>
+            <a:ext cx="2921000" cy="1968018"/>
           </a:xfrm>
           <a:prstGeom prst="rect">
             <a:avLst/>
           </a:prstGeom>
         </p:spPr>
       </p:pic>
-      <p:grpSp>
-        <p:nvGrpSpPr>
-          <p:cNvPr id="33" name="Group 32">
-            <a:extLst>
-              <a:ext uri="{FF2B5EF4-FFF2-40B4-BE49-F238E27FC236}">
-                <a16:creationId xmlns:a16="http://schemas.microsoft.com/office/drawing/2014/main" id="{61BF0D33-ADEC-2F4B-8CDC-BB03C99C5FFB}"/>
-              </a:ext>
-            </a:extLst>
-          </p:cNvPr>
-          <p:cNvGrpSpPr/>
-          <p:nvPr/>
-        </p:nvGrpSpPr>
-        <p:grpSpPr>
-          <a:xfrm>
-            <a:off x="242047" y="1416050"/>
-            <a:ext cx="5854700" cy="3983917"/>
-            <a:chOff x="242047" y="1416050"/>
-            <a:chExt cx="5854700" cy="3983917"/>
-          </a:xfrm>
-        </p:grpSpPr>
-        <p:pic>
-          <p:nvPicPr>
-            <p:cNvPr id="7" name="Picture 6">
-              <a:extLst>
-                <a:ext uri="{FF2B5EF4-FFF2-40B4-BE49-F238E27FC236}">
-                  <a16:creationId xmlns:a16="http://schemas.microsoft.com/office/drawing/2014/main" id="{D8AAA742-FA18-6B4B-9B1F-770F838CDE1F}"/>
-                </a:ext>
-              </a:extLst>
-            </p:cNvPr>
-            <p:cNvPicPr>
-              <a:picLocks noChangeAspect="1"/>
-            </p:cNvPicPr>
-            <p:nvPr/>
-          </p:nvPicPr>
-          <p:blipFill rotWithShape="1">
-            <a:blip r:embed="rId4"/>
-            <a:srcRect t="11030"/>
-            <a:stretch/>
-          </p:blipFill>
-          <p:spPr>
-            <a:xfrm>
-              <a:off x="242047" y="1456690"/>
-              <a:ext cx="5854700" cy="3918026"/>
-            </a:xfrm>
-            <a:prstGeom prst="rect">
-              <a:avLst/>
-            </a:prstGeom>
-          </p:spPr>
-        </p:pic>
-        <p:sp>
-          <p:nvSpPr>
-            <p:cNvPr id="12" name="Rectangle 11">
-              <a:extLst>
-                <a:ext uri="{FF2B5EF4-FFF2-40B4-BE49-F238E27FC236}">
-                  <a16:creationId xmlns:a16="http://schemas.microsoft.com/office/drawing/2014/main" id="{58F45423-C627-F242-9841-4752AF4C3E2D}"/>
-                </a:ext>
-              </a:extLst>
-            </p:cNvPr>
-            <p:cNvSpPr/>
-            <p:nvPr/>
-          </p:nvSpPr>
-          <p:spPr>
-            <a:xfrm>
-              <a:off x="467360" y="1584960"/>
-              <a:ext cx="425671" cy="3393440"/>
-            </a:xfrm>
-            <a:prstGeom prst="rect">
-              <a:avLst/>
-            </a:prstGeom>
-            <a:solidFill>
-              <a:schemeClr val="bg1"/>
-            </a:solidFill>
-            <a:ln>
-              <a:solidFill>
-                <a:schemeClr val="bg1"/>
-              </a:solidFill>
-            </a:ln>
-          </p:spPr>
-          <p:style>
-            <a:lnRef idx="2">
-              <a:schemeClr val="accent1">
-                <a:shade val="50000"/>
-              </a:schemeClr>
-            </a:lnRef>
-            <a:fillRef idx="1">
-              <a:schemeClr val="accent1"/>
-            </a:fillRef>
-            <a:effectRef idx="0">
-              <a:schemeClr val="accent1"/>
-            </a:effectRef>
-            <a:fontRef idx="minor">
-              <a:schemeClr val="lt1"/>
-            </a:fontRef>
-          </p:style>
-          <p:txBody>
-            <a:bodyPr rtlCol="0" anchor="ctr"/>
-            <a:lstStyle/>
-            <a:p>
-              <a:pPr algn="ctr"/>
-              <a:endParaRPr lang="en-GB"/>
-            </a:p>
-          </p:txBody>
-        </p:sp>
-        <p:sp>
-          <p:nvSpPr>
-            <p:cNvPr id="11" name="TextBox 10">
-              <a:extLst>
-                <a:ext uri="{FF2B5EF4-FFF2-40B4-BE49-F238E27FC236}">
-                  <a16:creationId xmlns:a16="http://schemas.microsoft.com/office/drawing/2014/main" id="{7B6CF11D-633F-9645-9665-084B4665923E}"/>
-                </a:ext>
-              </a:extLst>
-            </p:cNvPr>
-            <p:cNvSpPr txBox="1"/>
-            <p:nvPr/>
-          </p:nvSpPr>
-          <p:spPr>
-            <a:xfrm>
-              <a:off x="467360" y="2692400"/>
-              <a:ext cx="503664" cy="307777"/>
-            </a:xfrm>
-            <a:prstGeom prst="rect">
-              <a:avLst/>
-            </a:prstGeom>
-            <a:noFill/>
-          </p:spPr>
-          <p:txBody>
-            <a:bodyPr wrap="none" rtlCol="0">
-              <a:spAutoFit/>
-            </a:bodyPr>
-            <a:lstStyle/>
-            <a:p>
-              <a:r>
-                <a:rPr lang="en-GB" sz="1400" b="1" dirty="0">
-                  <a:latin typeface="CMU Serif Roman" panose="02000603000000000000" pitchFamily="2" charset="0"/>
-                  <a:ea typeface="CMU Serif Roman" panose="02000603000000000000" pitchFamily="2" charset="0"/>
-                  <a:cs typeface="CMU Serif Roman" panose="02000603000000000000" pitchFamily="2" charset="0"/>
-                </a:rPr>
-                <a:t>20.0</a:t>
-              </a:r>
-            </a:p>
-          </p:txBody>
-        </p:sp>
-        <p:sp>
-          <p:nvSpPr>
-            <p:cNvPr id="15" name="TextBox 14">
-              <a:extLst>
-                <a:ext uri="{FF2B5EF4-FFF2-40B4-BE49-F238E27FC236}">
-                  <a16:creationId xmlns:a16="http://schemas.microsoft.com/office/drawing/2014/main" id="{B9AC886D-9732-1340-8EA1-8508949D92ED}"/>
-                </a:ext>
-              </a:extLst>
-            </p:cNvPr>
-            <p:cNvSpPr txBox="1"/>
-            <p:nvPr/>
-          </p:nvSpPr>
-          <p:spPr>
-            <a:xfrm>
-              <a:off x="467360" y="2242383"/>
-              <a:ext cx="503664" cy="307777"/>
-            </a:xfrm>
-            <a:prstGeom prst="rect">
-              <a:avLst/>
-            </a:prstGeom>
-            <a:noFill/>
-          </p:spPr>
-          <p:txBody>
-            <a:bodyPr wrap="none" rtlCol="0">
-              <a:spAutoFit/>
-            </a:bodyPr>
-            <a:lstStyle/>
-            <a:p>
-              <a:r>
-                <a:rPr lang="en-GB" sz="1400" b="1" dirty="0">
-                  <a:latin typeface="CMU Serif Roman" panose="02000603000000000000" pitchFamily="2" charset="0"/>
-                  <a:ea typeface="CMU Serif Roman" panose="02000603000000000000" pitchFamily="2" charset="0"/>
-                  <a:cs typeface="CMU Serif Roman" panose="02000603000000000000" pitchFamily="2" charset="0"/>
-                </a:rPr>
-                <a:t>22.5</a:t>
-              </a:r>
-            </a:p>
-          </p:txBody>
-        </p:sp>
-        <p:sp>
-          <p:nvSpPr>
-            <p:cNvPr id="16" name="TextBox 15">
-              <a:extLst>
-                <a:ext uri="{FF2B5EF4-FFF2-40B4-BE49-F238E27FC236}">
-                  <a16:creationId xmlns:a16="http://schemas.microsoft.com/office/drawing/2014/main" id="{8C6EFC78-33A6-DA4D-8E05-FE88DB3F7963}"/>
-                </a:ext>
-              </a:extLst>
-            </p:cNvPr>
-            <p:cNvSpPr txBox="1"/>
-            <p:nvPr/>
-          </p:nvSpPr>
-          <p:spPr>
-            <a:xfrm>
-              <a:off x="467360" y="1760398"/>
-              <a:ext cx="503664" cy="307777"/>
-            </a:xfrm>
-            <a:prstGeom prst="rect">
-              <a:avLst/>
-            </a:prstGeom>
-            <a:noFill/>
-          </p:spPr>
-          <p:txBody>
-            <a:bodyPr wrap="none" rtlCol="0">
-              <a:spAutoFit/>
-            </a:bodyPr>
-            <a:lstStyle/>
-            <a:p>
-              <a:r>
-                <a:rPr lang="en-GB" sz="1400" b="1" dirty="0">
-                  <a:latin typeface="CMU Serif Roman" panose="02000603000000000000" pitchFamily="2" charset="0"/>
-                  <a:ea typeface="CMU Serif Roman" panose="02000603000000000000" pitchFamily="2" charset="0"/>
-                  <a:cs typeface="CMU Serif Roman" panose="02000603000000000000" pitchFamily="2" charset="0"/>
-                </a:rPr>
-                <a:t>25.0</a:t>
-              </a:r>
-            </a:p>
-          </p:txBody>
-        </p:sp>
-        <p:sp>
-          <p:nvSpPr>
-            <p:cNvPr id="17" name="TextBox 16">
-              <a:extLst>
-                <a:ext uri="{FF2B5EF4-FFF2-40B4-BE49-F238E27FC236}">
-                  <a16:creationId xmlns:a16="http://schemas.microsoft.com/office/drawing/2014/main" id="{074346F2-A6AB-2A45-A12E-FC047549D5E5}"/>
-                </a:ext>
-              </a:extLst>
-            </p:cNvPr>
-            <p:cNvSpPr txBox="1"/>
-            <p:nvPr/>
-          </p:nvSpPr>
-          <p:spPr>
-            <a:xfrm>
-              <a:off x="452864" y="3142417"/>
-              <a:ext cx="503664" cy="307777"/>
-            </a:xfrm>
-            <a:prstGeom prst="rect">
-              <a:avLst/>
-            </a:prstGeom>
-            <a:noFill/>
-          </p:spPr>
-          <p:txBody>
-            <a:bodyPr wrap="none" rtlCol="0">
-              <a:spAutoFit/>
-            </a:bodyPr>
-            <a:lstStyle/>
-            <a:p>
-              <a:r>
-                <a:rPr lang="en-GB" sz="1400" b="1" dirty="0">
-                  <a:latin typeface="CMU Serif Roman" panose="02000603000000000000" pitchFamily="2" charset="0"/>
-                  <a:ea typeface="CMU Serif Roman" panose="02000603000000000000" pitchFamily="2" charset="0"/>
-                  <a:cs typeface="CMU Serif Roman" panose="02000603000000000000" pitchFamily="2" charset="0"/>
-                </a:rPr>
-                <a:t>17.5</a:t>
-              </a:r>
-            </a:p>
-          </p:txBody>
-        </p:sp>
-        <p:sp>
-          <p:nvSpPr>
-            <p:cNvPr id="18" name="TextBox 17">
-              <a:extLst>
-                <a:ext uri="{FF2B5EF4-FFF2-40B4-BE49-F238E27FC236}">
-                  <a16:creationId xmlns:a16="http://schemas.microsoft.com/office/drawing/2014/main" id="{DFC5BE94-8412-AA41-A474-6CB8D21991E7}"/>
-                </a:ext>
-              </a:extLst>
-            </p:cNvPr>
-            <p:cNvSpPr txBox="1"/>
-            <p:nvPr/>
-          </p:nvSpPr>
-          <p:spPr>
-            <a:xfrm>
-              <a:off x="452864" y="3654660"/>
-              <a:ext cx="503664" cy="307777"/>
-            </a:xfrm>
-            <a:prstGeom prst="rect">
-              <a:avLst/>
-            </a:prstGeom>
-            <a:noFill/>
-          </p:spPr>
-          <p:txBody>
-            <a:bodyPr wrap="none" rtlCol="0">
-              <a:spAutoFit/>
-            </a:bodyPr>
-            <a:lstStyle/>
-            <a:p>
-              <a:r>
-                <a:rPr lang="en-GB" sz="1400" b="1" dirty="0">
-                  <a:latin typeface="CMU Serif Roman" panose="02000603000000000000" pitchFamily="2" charset="0"/>
-                  <a:ea typeface="CMU Serif Roman" panose="02000603000000000000" pitchFamily="2" charset="0"/>
-                  <a:cs typeface="CMU Serif Roman" panose="02000603000000000000" pitchFamily="2" charset="0"/>
-                </a:rPr>
-                <a:t>15.0</a:t>
-              </a:r>
-            </a:p>
-          </p:txBody>
-        </p:sp>
-        <p:sp>
-          <p:nvSpPr>
-            <p:cNvPr id="19" name="TextBox 18">
-              <a:extLst>
-                <a:ext uri="{FF2B5EF4-FFF2-40B4-BE49-F238E27FC236}">
-                  <a16:creationId xmlns:a16="http://schemas.microsoft.com/office/drawing/2014/main" id="{082335C7-8C77-AD41-B107-14E406383BEC}"/>
-                </a:ext>
-              </a:extLst>
-            </p:cNvPr>
-            <p:cNvSpPr txBox="1"/>
-            <p:nvPr/>
-          </p:nvSpPr>
-          <p:spPr>
-            <a:xfrm>
-              <a:off x="452864" y="4107617"/>
-              <a:ext cx="503664" cy="307777"/>
-            </a:xfrm>
-            <a:prstGeom prst="rect">
-              <a:avLst/>
-            </a:prstGeom>
-            <a:noFill/>
-          </p:spPr>
-          <p:txBody>
-            <a:bodyPr wrap="none" rtlCol="0">
-              <a:spAutoFit/>
-            </a:bodyPr>
-            <a:lstStyle/>
-            <a:p>
-              <a:r>
-                <a:rPr lang="en-GB" sz="1400" b="1" dirty="0">
-                  <a:latin typeface="CMU Serif Roman" panose="02000603000000000000" pitchFamily="2" charset="0"/>
-                  <a:ea typeface="CMU Serif Roman" panose="02000603000000000000" pitchFamily="2" charset="0"/>
-                  <a:cs typeface="CMU Serif Roman" panose="02000603000000000000" pitchFamily="2" charset="0"/>
-                </a:rPr>
-                <a:t>12.5</a:t>
-              </a:r>
-            </a:p>
-          </p:txBody>
-        </p:sp>
-        <p:sp>
-          <p:nvSpPr>
-            <p:cNvPr id="20" name="TextBox 19">
-              <a:extLst>
-                <a:ext uri="{FF2B5EF4-FFF2-40B4-BE49-F238E27FC236}">
-                  <a16:creationId xmlns:a16="http://schemas.microsoft.com/office/drawing/2014/main" id="{EC752D70-495B-5445-A2DB-95449A0DBD46}"/>
-                </a:ext>
-              </a:extLst>
-            </p:cNvPr>
-            <p:cNvSpPr txBox="1"/>
-            <p:nvPr/>
-          </p:nvSpPr>
-          <p:spPr>
-            <a:xfrm>
-              <a:off x="467360" y="4557634"/>
-              <a:ext cx="503664" cy="307777"/>
-            </a:xfrm>
-            <a:prstGeom prst="rect">
-              <a:avLst/>
-            </a:prstGeom>
-            <a:noFill/>
-          </p:spPr>
-          <p:txBody>
-            <a:bodyPr wrap="none" rtlCol="0">
-              <a:spAutoFit/>
-            </a:bodyPr>
-            <a:lstStyle/>
-            <a:p>
-              <a:r>
-                <a:rPr lang="en-GB" sz="1400" b="1" dirty="0">
-                  <a:latin typeface="CMU Serif Roman" panose="02000603000000000000" pitchFamily="2" charset="0"/>
-                  <a:ea typeface="CMU Serif Roman" panose="02000603000000000000" pitchFamily="2" charset="0"/>
-                  <a:cs typeface="CMU Serif Roman" panose="02000603000000000000" pitchFamily="2" charset="0"/>
-                </a:rPr>
-                <a:t>10.0</a:t>
-              </a:r>
-            </a:p>
-          </p:txBody>
-        </p:sp>
-        <p:sp>
-          <p:nvSpPr>
-            <p:cNvPr id="21" name="TextBox 20">
-              <a:extLst>
-                <a:ext uri="{FF2B5EF4-FFF2-40B4-BE49-F238E27FC236}">
-                  <a16:creationId xmlns:a16="http://schemas.microsoft.com/office/drawing/2014/main" id="{D0433224-0AB0-3644-B221-DE43354C7792}"/>
-                </a:ext>
-              </a:extLst>
-            </p:cNvPr>
-            <p:cNvSpPr txBox="1"/>
-            <p:nvPr/>
-          </p:nvSpPr>
-          <p:spPr>
-            <a:xfrm rot="16200000">
-              <a:off x="-747254" y="2995911"/>
-              <a:ext cx="2302233" cy="307777"/>
-            </a:xfrm>
-            <a:prstGeom prst="rect">
-              <a:avLst/>
-            </a:prstGeom>
-            <a:noFill/>
-          </p:spPr>
-          <p:txBody>
-            <a:bodyPr wrap="none" rtlCol="0">
-              <a:spAutoFit/>
-            </a:bodyPr>
-            <a:lstStyle/>
-            <a:p>
-              <a:r>
-                <a:rPr lang="en-GB" sz="1400" b="1" dirty="0">
-                  <a:latin typeface="CMU Serif Roman" panose="02000603000000000000" pitchFamily="2" charset="0"/>
-                  <a:ea typeface="CMU Serif Roman" panose="02000603000000000000" pitchFamily="2" charset="0"/>
-                  <a:cs typeface="CMU Serif Roman" panose="02000603000000000000" pitchFamily="2" charset="0"/>
-                </a:rPr>
-                <a:t>Effective Magnitude (mag)</a:t>
-              </a:r>
-            </a:p>
-          </p:txBody>
-        </p:sp>
-        <p:sp>
-          <p:nvSpPr>
-            <p:cNvPr id="23" name="Rectangle 22">
-              <a:extLst>
-                <a:ext uri="{FF2B5EF4-FFF2-40B4-BE49-F238E27FC236}">
-                  <a16:creationId xmlns:a16="http://schemas.microsoft.com/office/drawing/2014/main" id="{887D4FA3-1D1D-6A41-8A51-83ABF1F4BB15}"/>
-                </a:ext>
-              </a:extLst>
-            </p:cNvPr>
-            <p:cNvSpPr/>
-            <p:nvPr/>
-          </p:nvSpPr>
-          <p:spPr>
-            <a:xfrm>
-              <a:off x="971024" y="4978400"/>
-              <a:ext cx="4444256" cy="274320"/>
-            </a:xfrm>
-            <a:prstGeom prst="rect">
-              <a:avLst/>
-            </a:prstGeom>
-            <a:solidFill>
-              <a:schemeClr val="bg1"/>
-            </a:solidFill>
-            <a:ln>
-              <a:solidFill>
-                <a:schemeClr val="bg1"/>
-              </a:solidFill>
-            </a:ln>
-          </p:spPr>
-          <p:style>
-            <a:lnRef idx="2">
-              <a:schemeClr val="accent1">
-                <a:shade val="50000"/>
-              </a:schemeClr>
-            </a:lnRef>
-            <a:fillRef idx="1">
-              <a:schemeClr val="accent1"/>
-            </a:fillRef>
-            <a:effectRef idx="0">
-              <a:schemeClr val="accent1"/>
-            </a:effectRef>
-            <a:fontRef idx="minor">
-              <a:schemeClr val="lt1"/>
-            </a:fontRef>
-          </p:style>
-          <p:txBody>
-            <a:bodyPr rtlCol="0" anchor="ctr"/>
-            <a:lstStyle/>
-            <a:p>
-              <a:pPr algn="ctr"/>
-              <a:endParaRPr lang="en-GB"/>
-            </a:p>
-          </p:txBody>
-        </p:sp>
-        <p:sp>
-          <p:nvSpPr>
-            <p:cNvPr id="22" name="TextBox 21">
-              <a:extLst>
-                <a:ext uri="{FF2B5EF4-FFF2-40B4-BE49-F238E27FC236}">
-                  <a16:creationId xmlns:a16="http://schemas.microsoft.com/office/drawing/2014/main" id="{8BC26651-ED5D-A04C-989F-D0BC323A10B4}"/>
-                </a:ext>
-              </a:extLst>
-            </p:cNvPr>
-            <p:cNvSpPr txBox="1"/>
-            <p:nvPr/>
-          </p:nvSpPr>
-          <p:spPr>
-            <a:xfrm>
-              <a:off x="971024" y="4906051"/>
-              <a:ext cx="413896" cy="307777"/>
-            </a:xfrm>
-            <a:prstGeom prst="rect">
-              <a:avLst/>
-            </a:prstGeom>
-            <a:noFill/>
-          </p:spPr>
-          <p:txBody>
-            <a:bodyPr wrap="none" rtlCol="0">
-              <a:spAutoFit/>
-            </a:bodyPr>
-            <a:lstStyle/>
-            <a:p>
-              <a:r>
-                <a:rPr lang="en-GB" sz="1400" b="1" dirty="0">
-                  <a:latin typeface="CMU Serif Roman" panose="02000603000000000000" pitchFamily="2" charset="0"/>
-                  <a:ea typeface="CMU Serif Roman" panose="02000603000000000000" pitchFamily="2" charset="0"/>
-                  <a:cs typeface="CMU Serif Roman" panose="02000603000000000000" pitchFamily="2" charset="0"/>
-                </a:rPr>
-                <a:t>0.0</a:t>
-              </a:r>
-            </a:p>
-          </p:txBody>
-        </p:sp>
-        <p:sp>
-          <p:nvSpPr>
-            <p:cNvPr id="24" name="TextBox 23">
-              <a:extLst>
-                <a:ext uri="{FF2B5EF4-FFF2-40B4-BE49-F238E27FC236}">
-                  <a16:creationId xmlns:a16="http://schemas.microsoft.com/office/drawing/2014/main" id="{FBB732F3-58DF-F348-8805-FFA901CB1C37}"/>
-                </a:ext>
-              </a:extLst>
-            </p:cNvPr>
-            <p:cNvSpPr txBox="1"/>
-            <p:nvPr/>
-          </p:nvSpPr>
-          <p:spPr>
-            <a:xfrm>
-              <a:off x="1541927" y="4906051"/>
-              <a:ext cx="413896" cy="307777"/>
-            </a:xfrm>
-            <a:prstGeom prst="rect">
-              <a:avLst/>
-            </a:prstGeom>
-            <a:noFill/>
-          </p:spPr>
-          <p:txBody>
-            <a:bodyPr wrap="none" rtlCol="0">
-              <a:spAutoFit/>
-            </a:bodyPr>
-            <a:lstStyle/>
-            <a:p>
-              <a:r>
-                <a:rPr lang="en-GB" sz="1400" b="1" dirty="0">
-                  <a:latin typeface="CMU Serif Roman" panose="02000603000000000000" pitchFamily="2" charset="0"/>
-                  <a:ea typeface="CMU Serif Roman" panose="02000603000000000000" pitchFamily="2" charset="0"/>
-                  <a:cs typeface="CMU Serif Roman" panose="02000603000000000000" pitchFamily="2" charset="0"/>
-                </a:rPr>
-                <a:t>0.2</a:t>
-              </a:r>
-            </a:p>
-          </p:txBody>
-        </p:sp>
-        <p:sp>
-          <p:nvSpPr>
-            <p:cNvPr id="25" name="TextBox 24">
-              <a:extLst>
-                <a:ext uri="{FF2B5EF4-FFF2-40B4-BE49-F238E27FC236}">
-                  <a16:creationId xmlns:a16="http://schemas.microsoft.com/office/drawing/2014/main" id="{FD2AA821-E8DD-174A-99FC-E07DA540AD51}"/>
-                </a:ext>
-              </a:extLst>
-            </p:cNvPr>
-            <p:cNvSpPr txBox="1"/>
-            <p:nvPr/>
-          </p:nvSpPr>
-          <p:spPr>
-            <a:xfrm>
-              <a:off x="2112830" y="4906051"/>
-              <a:ext cx="413896" cy="307777"/>
-            </a:xfrm>
-            <a:prstGeom prst="rect">
-              <a:avLst/>
-            </a:prstGeom>
-            <a:noFill/>
-          </p:spPr>
-          <p:txBody>
-            <a:bodyPr wrap="none" rtlCol="0">
-              <a:spAutoFit/>
-            </a:bodyPr>
-            <a:lstStyle/>
-            <a:p>
-              <a:r>
-                <a:rPr lang="en-GB" sz="1400" b="1" dirty="0">
-                  <a:latin typeface="CMU Serif Roman" panose="02000603000000000000" pitchFamily="2" charset="0"/>
-                  <a:ea typeface="CMU Serif Roman" panose="02000603000000000000" pitchFamily="2" charset="0"/>
-                  <a:cs typeface="CMU Serif Roman" panose="02000603000000000000" pitchFamily="2" charset="0"/>
-                </a:rPr>
-                <a:t>0.4</a:t>
-              </a:r>
-            </a:p>
-          </p:txBody>
-        </p:sp>
-        <p:sp>
-          <p:nvSpPr>
-            <p:cNvPr id="26" name="TextBox 25">
-              <a:extLst>
-                <a:ext uri="{FF2B5EF4-FFF2-40B4-BE49-F238E27FC236}">
-                  <a16:creationId xmlns:a16="http://schemas.microsoft.com/office/drawing/2014/main" id="{01F0705C-CEFD-4F44-AC5E-D5B3A0F853FE}"/>
-                </a:ext>
-              </a:extLst>
-            </p:cNvPr>
-            <p:cNvSpPr txBox="1"/>
-            <p:nvPr/>
-          </p:nvSpPr>
-          <p:spPr>
-            <a:xfrm>
-              <a:off x="2622249" y="4904303"/>
-              <a:ext cx="413896" cy="307777"/>
-            </a:xfrm>
-            <a:prstGeom prst="rect">
-              <a:avLst/>
-            </a:prstGeom>
-            <a:noFill/>
-          </p:spPr>
-          <p:txBody>
-            <a:bodyPr wrap="none" rtlCol="0">
-              <a:spAutoFit/>
-            </a:bodyPr>
-            <a:lstStyle/>
-            <a:p>
-              <a:r>
-                <a:rPr lang="en-GB" sz="1400" b="1" dirty="0">
-                  <a:latin typeface="CMU Serif Roman" panose="02000603000000000000" pitchFamily="2" charset="0"/>
-                  <a:ea typeface="CMU Serif Roman" panose="02000603000000000000" pitchFamily="2" charset="0"/>
-                  <a:cs typeface="CMU Serif Roman" panose="02000603000000000000" pitchFamily="2" charset="0"/>
-                </a:rPr>
-                <a:t>0.6</a:t>
-              </a:r>
-            </a:p>
-          </p:txBody>
-        </p:sp>
-        <p:sp>
-          <p:nvSpPr>
-            <p:cNvPr id="27" name="TextBox 26">
-              <a:extLst>
-                <a:ext uri="{FF2B5EF4-FFF2-40B4-BE49-F238E27FC236}">
-                  <a16:creationId xmlns:a16="http://schemas.microsoft.com/office/drawing/2014/main" id="{61807DE1-6B62-2E4D-A62C-351CE0D30A3F}"/>
-                </a:ext>
-              </a:extLst>
-            </p:cNvPr>
-            <p:cNvSpPr txBox="1"/>
-            <p:nvPr/>
-          </p:nvSpPr>
-          <p:spPr>
-            <a:xfrm>
-              <a:off x="3169397" y="4904302"/>
-              <a:ext cx="413896" cy="307777"/>
-            </a:xfrm>
-            <a:prstGeom prst="rect">
-              <a:avLst/>
-            </a:prstGeom>
-            <a:noFill/>
-          </p:spPr>
-          <p:txBody>
-            <a:bodyPr wrap="none" rtlCol="0">
-              <a:spAutoFit/>
-            </a:bodyPr>
-            <a:lstStyle/>
-            <a:p>
-              <a:r>
-                <a:rPr lang="en-GB" sz="1400" b="1" dirty="0">
-                  <a:latin typeface="CMU Serif Roman" panose="02000603000000000000" pitchFamily="2" charset="0"/>
-                  <a:ea typeface="CMU Serif Roman" panose="02000603000000000000" pitchFamily="2" charset="0"/>
-                  <a:cs typeface="CMU Serif Roman" panose="02000603000000000000" pitchFamily="2" charset="0"/>
-                </a:rPr>
-                <a:t>0.8</a:t>
-              </a:r>
-            </a:p>
-          </p:txBody>
-        </p:sp>
-        <p:sp>
-          <p:nvSpPr>
-            <p:cNvPr id="28" name="TextBox 27">
-              <a:extLst>
-                <a:ext uri="{FF2B5EF4-FFF2-40B4-BE49-F238E27FC236}">
-                  <a16:creationId xmlns:a16="http://schemas.microsoft.com/office/drawing/2014/main" id="{D1D9396B-A0DD-0B40-89DA-0D748D63B6FC}"/>
-                </a:ext>
-              </a:extLst>
-            </p:cNvPr>
-            <p:cNvSpPr txBox="1"/>
-            <p:nvPr/>
-          </p:nvSpPr>
-          <p:spPr>
-            <a:xfrm>
-              <a:off x="3740300" y="4904301"/>
-              <a:ext cx="413896" cy="307777"/>
-            </a:xfrm>
-            <a:prstGeom prst="rect">
-              <a:avLst/>
-            </a:prstGeom>
-            <a:noFill/>
-          </p:spPr>
-          <p:txBody>
-            <a:bodyPr wrap="none" rtlCol="0">
-              <a:spAutoFit/>
-            </a:bodyPr>
-            <a:lstStyle/>
-            <a:p>
-              <a:r>
-                <a:rPr lang="en-GB" sz="1400" b="1" dirty="0">
-                  <a:latin typeface="CMU Serif Roman" panose="02000603000000000000" pitchFamily="2" charset="0"/>
-                  <a:ea typeface="CMU Serif Roman" panose="02000603000000000000" pitchFamily="2" charset="0"/>
-                  <a:cs typeface="CMU Serif Roman" panose="02000603000000000000" pitchFamily="2" charset="0"/>
-                </a:rPr>
-                <a:t>1.0</a:t>
-              </a:r>
-            </a:p>
-          </p:txBody>
-        </p:sp>
-        <p:sp>
-          <p:nvSpPr>
-            <p:cNvPr id="29" name="TextBox 28">
-              <a:extLst>
-                <a:ext uri="{FF2B5EF4-FFF2-40B4-BE49-F238E27FC236}">
-                  <a16:creationId xmlns:a16="http://schemas.microsoft.com/office/drawing/2014/main" id="{41C854BD-721D-554A-8AAF-6005D6B51987}"/>
-                </a:ext>
-              </a:extLst>
-            </p:cNvPr>
-            <p:cNvSpPr txBox="1"/>
-            <p:nvPr/>
-          </p:nvSpPr>
-          <p:spPr>
-            <a:xfrm>
-              <a:off x="4289639" y="4904300"/>
-              <a:ext cx="413896" cy="307777"/>
-            </a:xfrm>
-            <a:prstGeom prst="rect">
-              <a:avLst/>
-            </a:prstGeom>
-            <a:noFill/>
-          </p:spPr>
-          <p:txBody>
-            <a:bodyPr wrap="none" rtlCol="0">
-              <a:spAutoFit/>
-            </a:bodyPr>
-            <a:lstStyle/>
-            <a:p>
-              <a:r>
-                <a:rPr lang="en-GB" sz="1400" b="1" dirty="0">
-                  <a:latin typeface="CMU Serif Roman" panose="02000603000000000000" pitchFamily="2" charset="0"/>
-                  <a:ea typeface="CMU Serif Roman" panose="02000603000000000000" pitchFamily="2" charset="0"/>
-                  <a:cs typeface="CMU Serif Roman" panose="02000603000000000000" pitchFamily="2" charset="0"/>
-                </a:rPr>
-                <a:t>1.2</a:t>
-              </a:r>
-            </a:p>
-          </p:txBody>
-        </p:sp>
-        <p:sp>
-          <p:nvSpPr>
-            <p:cNvPr id="30" name="TextBox 29">
-              <a:extLst>
-                <a:ext uri="{FF2B5EF4-FFF2-40B4-BE49-F238E27FC236}">
-                  <a16:creationId xmlns:a16="http://schemas.microsoft.com/office/drawing/2014/main" id="{6595007E-F46B-0146-ACD7-592B5E31ED23}"/>
-                </a:ext>
-              </a:extLst>
-            </p:cNvPr>
-            <p:cNvSpPr txBox="1"/>
-            <p:nvPr/>
-          </p:nvSpPr>
-          <p:spPr>
-            <a:xfrm>
-              <a:off x="4824756" y="4904300"/>
-              <a:ext cx="413896" cy="307777"/>
-            </a:xfrm>
-            <a:prstGeom prst="rect">
-              <a:avLst/>
-            </a:prstGeom>
-            <a:noFill/>
-          </p:spPr>
-          <p:txBody>
-            <a:bodyPr wrap="none" rtlCol="0">
-              <a:spAutoFit/>
-            </a:bodyPr>
-            <a:lstStyle/>
-            <a:p>
-              <a:r>
-                <a:rPr lang="en-GB" sz="1400" b="1" dirty="0">
-                  <a:latin typeface="CMU Serif Roman" panose="02000603000000000000" pitchFamily="2" charset="0"/>
-                  <a:ea typeface="CMU Serif Roman" panose="02000603000000000000" pitchFamily="2" charset="0"/>
-                  <a:cs typeface="CMU Serif Roman" panose="02000603000000000000" pitchFamily="2" charset="0"/>
-                </a:rPr>
-                <a:t>1.4</a:t>
-              </a:r>
-            </a:p>
-          </p:txBody>
-        </p:sp>
-        <p:sp>
-          <p:nvSpPr>
-            <p:cNvPr id="31" name="TextBox 30">
-              <a:extLst>
-                <a:ext uri="{FF2B5EF4-FFF2-40B4-BE49-F238E27FC236}">
-                  <a16:creationId xmlns:a16="http://schemas.microsoft.com/office/drawing/2014/main" id="{6FA90839-723B-C34F-80DC-4DC2DE4ABDBA}"/>
-                </a:ext>
-              </a:extLst>
-            </p:cNvPr>
-            <p:cNvSpPr txBox="1"/>
-            <p:nvPr/>
-          </p:nvSpPr>
-          <p:spPr>
-            <a:xfrm>
-              <a:off x="2708157" y="5107579"/>
-              <a:ext cx="795411" cy="292388"/>
-            </a:xfrm>
-            <a:prstGeom prst="rect">
-              <a:avLst/>
-            </a:prstGeom>
-            <a:noFill/>
-          </p:spPr>
-          <p:txBody>
-            <a:bodyPr wrap="none" rtlCol="0">
-              <a:spAutoFit/>
-            </a:bodyPr>
-            <a:lstStyle/>
-            <a:p>
-              <a:r>
-                <a:rPr lang="en-GB" sz="1300" b="1" dirty="0">
-                  <a:latin typeface="CMU Serif Roman" panose="02000603000000000000" pitchFamily="2" charset="0"/>
-                  <a:ea typeface="CMU Serif Roman" panose="02000603000000000000" pitchFamily="2" charset="0"/>
-                  <a:cs typeface="CMU Serif Roman" panose="02000603000000000000" pitchFamily="2" charset="0"/>
-                </a:rPr>
-                <a:t>Redshift</a:t>
-              </a:r>
-            </a:p>
-          </p:txBody>
-        </p:sp>
-        <p:sp>
-          <p:nvSpPr>
-            <p:cNvPr id="32" name="Rectangle 31">
-              <a:extLst>
-                <a:ext uri="{FF2B5EF4-FFF2-40B4-BE49-F238E27FC236}">
-                  <a16:creationId xmlns:a16="http://schemas.microsoft.com/office/drawing/2014/main" id="{A413874D-CFC1-4645-BDBD-7AF4268C5A95}"/>
-                </a:ext>
-              </a:extLst>
-            </p:cNvPr>
-            <p:cNvSpPr/>
-            <p:nvPr/>
-          </p:nvSpPr>
-          <p:spPr>
-            <a:xfrm>
-              <a:off x="1042144" y="1416050"/>
-              <a:ext cx="4444256" cy="60960"/>
-            </a:xfrm>
-            <a:prstGeom prst="rect">
-              <a:avLst/>
-            </a:prstGeom>
-            <a:solidFill>
-              <a:schemeClr val="bg1"/>
-            </a:solidFill>
-            <a:ln>
-              <a:solidFill>
-                <a:schemeClr val="bg1"/>
-              </a:solidFill>
-            </a:ln>
-          </p:spPr>
-          <p:style>
-            <a:lnRef idx="2">
-              <a:schemeClr val="accent1">
-                <a:shade val="50000"/>
-              </a:schemeClr>
-            </a:lnRef>
-            <a:fillRef idx="1">
-              <a:schemeClr val="accent1"/>
-            </a:fillRef>
-            <a:effectRef idx="0">
-              <a:schemeClr val="accent1"/>
-            </a:effectRef>
-            <a:fontRef idx="minor">
-              <a:schemeClr val="lt1"/>
-            </a:fontRef>
-          </p:style>
-          <p:txBody>
-            <a:bodyPr rtlCol="0" anchor="ctr"/>
-            <a:lstStyle/>
-            <a:p>
-              <a:pPr algn="ctr"/>
-              <a:endParaRPr lang="en-GB"/>
-            </a:p>
-          </p:txBody>
-        </p:sp>
-      </p:grpSp>
     </p:spTree>
     <p:extLst>
       <p:ext uri="{BB962C8B-B14F-4D97-AF65-F5344CB8AC3E}">

</xml_diff>

<commit_message>
#5 - small edit to a sentence
</commit_message>
<xml_diff>
--- a/physics_problem_solving/report/results/results.pptx
+++ b/physics_problem_solving/report/results/results.pptx
@@ -107,6 +107,11 @@
       </a:defRPr>
     </a:lvl9pPr>
   </p:defaultTextStyle>
+  <p:extLst>
+    <p:ext uri="{EFAFB233-063F-42B5-8137-9DF3F51BA10A}">
+      <p15:sldGuideLst xmlns:p15="http://schemas.microsoft.com/office/powerpoint/2012/main"/>
+    </p:ext>
+  </p:extLst>
 </p:presentation>
 </file>
 
@@ -192,7 +197,7 @@
           <a:p>
             <a:fld id="{66DB477B-3ED5-674B-AD85-6365D059978D}" type="datetimeFigureOut">
               <a:rPr lang="en-GB" smtClean="0"/>
-              <a:t>02/03/2018</a:t>
+              <a:t>03/03/2018</a:t>
             </a:fld>
             <a:endParaRPr lang="en-GB"/>
           </a:p>
@@ -693,7 +698,7 @@
           <a:p>
             <a:fld id="{B5A8713F-5DE8-C542-BD77-F74425F3AB2A}" type="datetimeFigureOut">
               <a:rPr lang="en-GB" smtClean="0"/>
-              <a:t>02/03/2018</a:t>
+              <a:t>03/03/2018</a:t>
             </a:fld>
             <a:endParaRPr lang="en-GB"/>
           </a:p>
@@ -893,7 +898,7 @@
           <a:p>
             <a:fld id="{B5A8713F-5DE8-C542-BD77-F74425F3AB2A}" type="datetimeFigureOut">
               <a:rPr lang="en-GB" smtClean="0"/>
-              <a:t>02/03/2018</a:t>
+              <a:t>03/03/2018</a:t>
             </a:fld>
             <a:endParaRPr lang="en-GB"/>
           </a:p>
@@ -1103,7 +1108,7 @@
           <a:p>
             <a:fld id="{B5A8713F-5DE8-C542-BD77-F74425F3AB2A}" type="datetimeFigureOut">
               <a:rPr lang="en-GB" smtClean="0"/>
-              <a:t>02/03/2018</a:t>
+              <a:t>03/03/2018</a:t>
             </a:fld>
             <a:endParaRPr lang="en-GB"/>
           </a:p>
@@ -1303,7 +1308,7 @@
           <a:p>
             <a:fld id="{B5A8713F-5DE8-C542-BD77-F74425F3AB2A}" type="datetimeFigureOut">
               <a:rPr lang="en-GB" smtClean="0"/>
-              <a:t>02/03/2018</a:t>
+              <a:t>03/03/2018</a:t>
             </a:fld>
             <a:endParaRPr lang="en-GB"/>
           </a:p>
@@ -1579,7 +1584,7 @@
           <a:p>
             <a:fld id="{B5A8713F-5DE8-C542-BD77-F74425F3AB2A}" type="datetimeFigureOut">
               <a:rPr lang="en-GB" smtClean="0"/>
-              <a:t>02/03/2018</a:t>
+              <a:t>03/03/2018</a:t>
             </a:fld>
             <a:endParaRPr lang="en-GB"/>
           </a:p>
@@ -1847,7 +1852,7 @@
           <a:p>
             <a:fld id="{B5A8713F-5DE8-C542-BD77-F74425F3AB2A}" type="datetimeFigureOut">
               <a:rPr lang="en-GB" smtClean="0"/>
-              <a:t>02/03/2018</a:t>
+              <a:t>03/03/2018</a:t>
             </a:fld>
             <a:endParaRPr lang="en-GB"/>
           </a:p>
@@ -2262,7 +2267,7 @@
           <a:p>
             <a:fld id="{B5A8713F-5DE8-C542-BD77-F74425F3AB2A}" type="datetimeFigureOut">
               <a:rPr lang="en-GB" smtClean="0"/>
-              <a:t>02/03/2018</a:t>
+              <a:t>03/03/2018</a:t>
             </a:fld>
             <a:endParaRPr lang="en-GB"/>
           </a:p>
@@ -2404,7 +2409,7 @@
           <a:p>
             <a:fld id="{B5A8713F-5DE8-C542-BD77-F74425F3AB2A}" type="datetimeFigureOut">
               <a:rPr lang="en-GB" smtClean="0"/>
-              <a:t>02/03/2018</a:t>
+              <a:t>03/03/2018</a:t>
             </a:fld>
             <a:endParaRPr lang="en-GB"/>
           </a:p>
@@ -2517,7 +2522,7 @@
           <a:p>
             <a:fld id="{B5A8713F-5DE8-C542-BD77-F74425F3AB2A}" type="datetimeFigureOut">
               <a:rPr lang="en-GB" smtClean="0"/>
-              <a:t>02/03/2018</a:t>
+              <a:t>03/03/2018</a:t>
             </a:fld>
             <a:endParaRPr lang="en-GB"/>
           </a:p>
@@ -2830,7 +2835,7 @@
           <a:p>
             <a:fld id="{B5A8713F-5DE8-C542-BD77-F74425F3AB2A}" type="datetimeFigureOut">
               <a:rPr lang="en-GB" smtClean="0"/>
-              <a:t>02/03/2018</a:t>
+              <a:t>03/03/2018</a:t>
             </a:fld>
             <a:endParaRPr lang="en-GB"/>
           </a:p>
@@ -3119,7 +3124,7 @@
           <a:p>
             <a:fld id="{B5A8713F-5DE8-C542-BD77-F74425F3AB2A}" type="datetimeFigureOut">
               <a:rPr lang="en-GB" smtClean="0"/>
-              <a:t>02/03/2018</a:t>
+              <a:t>03/03/2018</a:t>
             </a:fld>
             <a:endParaRPr lang="en-GB"/>
           </a:p>
@@ -3362,7 +3367,7 @@
           <a:p>
             <a:fld id="{B5A8713F-5DE8-C542-BD77-F74425F3AB2A}" type="datetimeFigureOut">
               <a:rPr lang="en-GB" smtClean="0"/>
-              <a:t>02/03/2018</a:t>
+              <a:t>03/03/2018</a:t>
             </a:fld>
             <a:endParaRPr lang="en-GB"/>
           </a:p>
@@ -3795,6 +3800,35 @@
         </p:nvPicPr>
         <p:blipFill rotWithShape="1">
           <a:blip r:embed="rId3"/>
+          <a:srcRect t="10426"/>
+          <a:stretch/>
+        </p:blipFill>
+        <p:spPr>
+          <a:xfrm>
+            <a:off x="2956555" y="3406698"/>
+            <a:ext cx="2921000" cy="1968018"/>
+          </a:xfrm>
+          <a:prstGeom prst="rect">
+            <a:avLst/>
+          </a:prstGeom>
+        </p:spPr>
+      </p:pic>
+      <p:pic>
+        <p:nvPicPr>
+          <p:cNvPr id="3" name="Picture 2">
+            <a:extLst>
+              <a:ext uri="{FF2B5EF4-FFF2-40B4-BE49-F238E27FC236}">
+                <a16:creationId xmlns:a16="http://schemas.microsoft.com/office/drawing/2014/main" id="{356ECD49-C170-4449-815F-F29DE2224FD7}"/>
+              </a:ext>
+            </a:extLst>
+          </p:cNvPr>
+          <p:cNvPicPr>
+            <a:picLocks noChangeAspect="1"/>
+          </p:cNvPicPr>
+          <p:nvPr/>
+        </p:nvPicPr>
+        <p:blipFill rotWithShape="1">
+          <a:blip r:embed="rId4"/>
           <a:srcRect t="10426"/>
           <a:stretch/>
         </p:blipFill>

</xml_diff>

<commit_message>
#3 - stress work
- it's difficult to build on what i've done, give it time!
- improved the covariance triangle graph
</commit_message>
<xml_diff>
--- a/physics_problem_solving/report/results/results.pptx
+++ b/physics_problem_solving/report/results/results.pptx
@@ -197,7 +197,7 @@
           <a:p>
             <a:fld id="{66DB477B-3ED5-674B-AD85-6365D059978D}" type="datetimeFigureOut">
               <a:rPr lang="en-GB" smtClean="0"/>
-              <a:t>03/03/2018</a:t>
+              <a:t>04/03/2018</a:t>
             </a:fld>
             <a:endParaRPr lang="en-GB"/>
           </a:p>
@@ -698,7 +698,7 @@
           <a:p>
             <a:fld id="{B5A8713F-5DE8-C542-BD77-F74425F3AB2A}" type="datetimeFigureOut">
               <a:rPr lang="en-GB" smtClean="0"/>
-              <a:t>03/03/2018</a:t>
+              <a:t>04/03/2018</a:t>
             </a:fld>
             <a:endParaRPr lang="en-GB"/>
           </a:p>
@@ -898,7 +898,7 @@
           <a:p>
             <a:fld id="{B5A8713F-5DE8-C542-BD77-F74425F3AB2A}" type="datetimeFigureOut">
               <a:rPr lang="en-GB" smtClean="0"/>
-              <a:t>03/03/2018</a:t>
+              <a:t>04/03/2018</a:t>
             </a:fld>
             <a:endParaRPr lang="en-GB"/>
           </a:p>
@@ -1108,7 +1108,7 @@
           <a:p>
             <a:fld id="{B5A8713F-5DE8-C542-BD77-F74425F3AB2A}" type="datetimeFigureOut">
               <a:rPr lang="en-GB" smtClean="0"/>
-              <a:t>03/03/2018</a:t>
+              <a:t>04/03/2018</a:t>
             </a:fld>
             <a:endParaRPr lang="en-GB"/>
           </a:p>
@@ -1308,7 +1308,7 @@
           <a:p>
             <a:fld id="{B5A8713F-5DE8-C542-BD77-F74425F3AB2A}" type="datetimeFigureOut">
               <a:rPr lang="en-GB" smtClean="0"/>
-              <a:t>03/03/2018</a:t>
+              <a:t>04/03/2018</a:t>
             </a:fld>
             <a:endParaRPr lang="en-GB"/>
           </a:p>
@@ -1584,7 +1584,7 @@
           <a:p>
             <a:fld id="{B5A8713F-5DE8-C542-BD77-F74425F3AB2A}" type="datetimeFigureOut">
               <a:rPr lang="en-GB" smtClean="0"/>
-              <a:t>03/03/2018</a:t>
+              <a:t>04/03/2018</a:t>
             </a:fld>
             <a:endParaRPr lang="en-GB"/>
           </a:p>
@@ -1852,7 +1852,7 @@
           <a:p>
             <a:fld id="{B5A8713F-5DE8-C542-BD77-F74425F3AB2A}" type="datetimeFigureOut">
               <a:rPr lang="en-GB" smtClean="0"/>
-              <a:t>03/03/2018</a:t>
+              <a:t>04/03/2018</a:t>
             </a:fld>
             <a:endParaRPr lang="en-GB"/>
           </a:p>
@@ -2267,7 +2267,7 @@
           <a:p>
             <a:fld id="{B5A8713F-5DE8-C542-BD77-F74425F3AB2A}" type="datetimeFigureOut">
               <a:rPr lang="en-GB" smtClean="0"/>
-              <a:t>03/03/2018</a:t>
+              <a:t>04/03/2018</a:t>
             </a:fld>
             <a:endParaRPr lang="en-GB"/>
           </a:p>
@@ -2409,7 +2409,7 @@
           <a:p>
             <a:fld id="{B5A8713F-5DE8-C542-BD77-F74425F3AB2A}" type="datetimeFigureOut">
               <a:rPr lang="en-GB" smtClean="0"/>
-              <a:t>03/03/2018</a:t>
+              <a:t>04/03/2018</a:t>
             </a:fld>
             <a:endParaRPr lang="en-GB"/>
           </a:p>
@@ -2522,7 +2522,7 @@
           <a:p>
             <a:fld id="{B5A8713F-5DE8-C542-BD77-F74425F3AB2A}" type="datetimeFigureOut">
               <a:rPr lang="en-GB" smtClean="0"/>
-              <a:t>03/03/2018</a:t>
+              <a:t>04/03/2018</a:t>
             </a:fld>
             <a:endParaRPr lang="en-GB"/>
           </a:p>
@@ -2835,7 +2835,7 @@
           <a:p>
             <a:fld id="{B5A8713F-5DE8-C542-BD77-F74425F3AB2A}" type="datetimeFigureOut">
               <a:rPr lang="en-GB" smtClean="0"/>
-              <a:t>03/03/2018</a:t>
+              <a:t>04/03/2018</a:t>
             </a:fld>
             <a:endParaRPr lang="en-GB"/>
           </a:p>
@@ -3124,7 +3124,7 @@
           <a:p>
             <a:fld id="{B5A8713F-5DE8-C542-BD77-F74425F3AB2A}" type="datetimeFigureOut">
               <a:rPr lang="en-GB" smtClean="0"/>
-              <a:t>03/03/2018</a:t>
+              <a:t>04/03/2018</a:t>
             </a:fld>
             <a:endParaRPr lang="en-GB"/>
           </a:p>
@@ -3367,7 +3367,7 @@
           <a:p>
             <a:fld id="{B5A8713F-5DE8-C542-BD77-F74425F3AB2A}" type="datetimeFigureOut">
               <a:rPr lang="en-GB" smtClean="0"/>
-              <a:t>03/03/2018</a:t>
+              <a:t>04/03/2018</a:t>
             </a:fld>
             <a:endParaRPr lang="en-GB"/>
           </a:p>
@@ -3786,10 +3786,10 @@
       </p:grpSpPr>
       <p:pic>
         <p:nvPicPr>
-          <p:cNvPr id="35" name="Picture 34">
-            <a:extLst>
-              <a:ext uri="{FF2B5EF4-FFF2-40B4-BE49-F238E27FC236}">
-                <a16:creationId xmlns:a16="http://schemas.microsoft.com/office/drawing/2014/main" id="{690A6320-9EE7-C440-9BC2-A6E8FD664480}"/>
+          <p:cNvPr id="4" name="Picture 3">
+            <a:extLst>
+              <a:ext uri="{FF2B5EF4-FFF2-40B4-BE49-F238E27FC236}">
+                <a16:creationId xmlns:a16="http://schemas.microsoft.com/office/drawing/2014/main" id="{1BCA6CD7-D550-F143-A230-BDB182BCF325}"/>
               </a:ext>
             </a:extLst>
           </p:cNvPr>
@@ -3800,13 +3800,13 @@
         </p:nvPicPr>
         <p:blipFill rotWithShape="1">
           <a:blip r:embed="rId3"/>
-          <a:srcRect t="10426"/>
+          <a:srcRect t="10169"/>
           <a:stretch/>
         </p:blipFill>
         <p:spPr>
           <a:xfrm>
-            <a:off x="2956555" y="3406698"/>
-            <a:ext cx="2921000" cy="1968018"/>
+            <a:off x="2956555" y="2910468"/>
+            <a:ext cx="3657600" cy="2464248"/>
           </a:xfrm>
           <a:prstGeom prst="rect">
             <a:avLst/>
@@ -3815,10 +3815,10 @@
       </p:pic>
       <p:pic>
         <p:nvPicPr>
-          <p:cNvPr id="3" name="Picture 2">
-            <a:extLst>
-              <a:ext uri="{FF2B5EF4-FFF2-40B4-BE49-F238E27FC236}">
-                <a16:creationId xmlns:a16="http://schemas.microsoft.com/office/drawing/2014/main" id="{356ECD49-C170-4449-815F-F29DE2224FD7}"/>
+          <p:cNvPr id="35" name="Picture 34">
+            <a:extLst>
+              <a:ext uri="{FF2B5EF4-FFF2-40B4-BE49-F238E27FC236}">
+                <a16:creationId xmlns:a16="http://schemas.microsoft.com/office/drawing/2014/main" id="{690A6320-9EE7-C440-9BC2-A6E8FD664480}"/>
               </a:ext>
             </a:extLst>
           </p:cNvPr>
@@ -3834,7 +3834,7 @@
         </p:blipFill>
         <p:spPr>
           <a:xfrm>
-            <a:off x="2956555" y="3406698"/>
+            <a:off x="8155876" y="2394809"/>
             <a:ext cx="2921000" cy="1968018"/>
           </a:xfrm>
           <a:prstGeom prst="rect">
@@ -3842,6 +3842,1039 @@
           </a:prstGeom>
         </p:spPr>
       </p:pic>
+      <p:pic>
+        <p:nvPicPr>
+          <p:cNvPr id="3" name="Picture 2">
+            <a:extLst>
+              <a:ext uri="{FF2B5EF4-FFF2-40B4-BE49-F238E27FC236}">
+                <a16:creationId xmlns:a16="http://schemas.microsoft.com/office/drawing/2014/main" id="{356ECD49-C170-4449-815F-F29DE2224FD7}"/>
+              </a:ext>
+            </a:extLst>
+          </p:cNvPr>
+          <p:cNvPicPr>
+            <a:picLocks noChangeAspect="1"/>
+          </p:cNvPicPr>
+          <p:nvPr/>
+        </p:nvPicPr>
+        <p:blipFill rotWithShape="1">
+          <a:blip r:embed="rId5"/>
+          <a:srcRect t="10426"/>
+          <a:stretch/>
+        </p:blipFill>
+        <p:spPr>
+          <a:xfrm>
+            <a:off x="7854274" y="106174"/>
+            <a:ext cx="2921000" cy="1968018"/>
+          </a:xfrm>
+          <a:prstGeom prst="rect">
+            <a:avLst/>
+          </a:prstGeom>
+        </p:spPr>
+      </p:pic>
+      <mc:AlternateContent xmlns:mc="http://schemas.openxmlformats.org/markup-compatibility/2006">
+        <mc:Choice xmlns:a14="http://schemas.microsoft.com/office/drawing/2010/main" Requires="a14">
+          <p:sp>
+            <p:nvSpPr>
+              <p:cNvPr id="5" name="TextBox 4">
+                <a:extLst>
+                  <a:ext uri="{FF2B5EF4-FFF2-40B4-BE49-F238E27FC236}">
+                    <a16:creationId xmlns:a16="http://schemas.microsoft.com/office/drawing/2014/main" id="{53386643-C5B7-CF49-87BF-F45B74C8466B}"/>
+                  </a:ext>
+                </a:extLst>
+              </p:cNvPr>
+              <p:cNvSpPr txBox="1"/>
+              <p:nvPr/>
+            </p:nvSpPr>
+            <p:spPr>
+              <a:xfrm>
+                <a:off x="3334214" y="3378818"/>
+                <a:ext cx="708848" cy="184666"/>
+              </a:xfrm>
+              <a:prstGeom prst="rect">
+                <a:avLst/>
+              </a:prstGeom>
+              <a:noFill/>
+            </p:spPr>
+            <p:txBody>
+              <a:bodyPr wrap="square" rtlCol="0">
+                <a:spAutoFit/>
+              </a:bodyPr>
+              <a:lstStyle/>
+              <a:p>
+                <a14:m>
+                  <m:oMath xmlns:m="http://schemas.openxmlformats.org/officeDocument/2006/math">
+                    <m:r>
+                      <a:rPr lang="en-GB" sz="600" b="1" i="1" smtClean="0">
+                        <a:latin typeface="Cambria Math" panose="02040503050406030204" pitchFamily="18" charset="0"/>
+                        <a:ea typeface="Cambria Math" panose="02040503050406030204" pitchFamily="18" charset="0"/>
+                        <a:cs typeface="CMU Serif Roman" panose="02000603000000000000" pitchFamily="2" charset="0"/>
+                      </a:rPr>
+                      <m:t>×</m:t>
+                    </m:r>
+                  </m:oMath>
+                </a14:m>
+                <a:r>
+                  <a:rPr lang="en-GB" sz="570" b="1" dirty="0">
+                    <a:latin typeface="CMU Serif Roman" panose="02000603000000000000" pitchFamily="2" charset="0"/>
+                    <a:ea typeface="CMU Serif Roman" panose="02000603000000000000" pitchFamily="2" charset="0"/>
+                    <a:cs typeface="CMU Serif Roman" panose="02000603000000000000" pitchFamily="2" charset="0"/>
+                  </a:rPr>
+                  <a:t>10</a:t>
+                </a:r>
+                <a:r>
+                  <a:rPr lang="en-GB" sz="570" b="1" baseline="30000" dirty="0">
+                    <a:latin typeface="CMU Serif Roman" panose="02000603000000000000" pitchFamily="2" charset="0"/>
+                    <a:ea typeface="CMU Serif Roman" panose="02000603000000000000" pitchFamily="2" charset="0"/>
+                    <a:cs typeface="CMU Serif Roman" panose="02000603000000000000" pitchFamily="2" charset="0"/>
+                  </a:rPr>
+                  <a:t>-5</a:t>
+                </a:r>
+                <a:endParaRPr lang="en-GB" sz="570" b="1" dirty="0">
+                  <a:latin typeface="CMU Serif Roman" panose="02000603000000000000" pitchFamily="2" charset="0"/>
+                  <a:ea typeface="CMU Serif Roman" panose="02000603000000000000" pitchFamily="2" charset="0"/>
+                  <a:cs typeface="CMU Serif Roman" panose="02000603000000000000" pitchFamily="2" charset="0"/>
+                </a:endParaRPr>
+              </a:p>
+            </p:txBody>
+          </p:sp>
+        </mc:Choice>
+        <mc:Fallback>
+          <p:sp>
+            <p:nvSpPr>
+              <p:cNvPr id="5" name="TextBox 4">
+                <a:extLst>
+                  <a:ext uri="{FF2B5EF4-FFF2-40B4-BE49-F238E27FC236}">
+                    <a16:creationId xmlns:a16="http://schemas.microsoft.com/office/drawing/2014/main" id="{53386643-C5B7-CF49-87BF-F45B74C8466B}"/>
+                  </a:ext>
+                </a:extLst>
+              </p:cNvPr>
+              <p:cNvSpPr txBox="1">
+                <a:spLocks noRot="1" noChangeAspect="1" noMove="1" noResize="1" noEditPoints="1" noAdjustHandles="1" noChangeArrowheads="1" noChangeShapeType="1" noTextEdit="1"/>
+              </p:cNvSpPr>
+              <p:nvPr/>
+            </p:nvSpPr>
+            <p:spPr>
+              <a:xfrm>
+                <a:off x="3334214" y="3378818"/>
+                <a:ext cx="708848" cy="184666"/>
+              </a:xfrm>
+              <a:prstGeom prst="rect">
+                <a:avLst/>
+              </a:prstGeom>
+              <a:blipFill>
+                <a:blip r:embed="rId6"/>
+                <a:stretch>
+                  <a:fillRect/>
+                </a:stretch>
+              </a:blipFill>
+            </p:spPr>
+            <p:txBody>
+              <a:bodyPr/>
+              <a:lstStyle/>
+              <a:p>
+                <a:r>
+                  <a:rPr lang="en-GB">
+                    <a:noFill/>
+                  </a:rPr>
+                  <a:t> </a:t>
+                </a:r>
+              </a:p>
+            </p:txBody>
+          </p:sp>
+        </mc:Fallback>
+      </mc:AlternateContent>
+      <mc:AlternateContent xmlns:mc="http://schemas.openxmlformats.org/markup-compatibility/2006">
+        <mc:Choice xmlns:a14="http://schemas.microsoft.com/office/drawing/2010/main" Requires="a14">
+          <p:sp>
+            <p:nvSpPr>
+              <p:cNvPr id="7" name="TextBox 6">
+                <a:extLst>
+                  <a:ext uri="{FF2B5EF4-FFF2-40B4-BE49-F238E27FC236}">
+                    <a16:creationId xmlns:a16="http://schemas.microsoft.com/office/drawing/2014/main" id="{5857D9CB-E354-D748-9081-DEB2F09607CE}"/>
+                  </a:ext>
+                </a:extLst>
+              </p:cNvPr>
+              <p:cNvSpPr txBox="1"/>
+              <p:nvPr/>
+            </p:nvSpPr>
+            <p:spPr>
+              <a:xfrm>
+                <a:off x="6146180" y="5224173"/>
+                <a:ext cx="708848" cy="184666"/>
+              </a:xfrm>
+              <a:prstGeom prst="rect">
+                <a:avLst/>
+              </a:prstGeom>
+              <a:noFill/>
+            </p:spPr>
+            <p:txBody>
+              <a:bodyPr wrap="square" rtlCol="0">
+                <a:spAutoFit/>
+              </a:bodyPr>
+              <a:lstStyle/>
+              <a:p>
+                <a14:m>
+                  <m:oMath xmlns:m="http://schemas.openxmlformats.org/officeDocument/2006/math">
+                    <m:r>
+                      <a:rPr lang="en-GB" sz="600" b="1" i="1" smtClean="0">
+                        <a:latin typeface="Cambria Math" panose="02040503050406030204" pitchFamily="18" charset="0"/>
+                        <a:ea typeface="Cambria Math" panose="02040503050406030204" pitchFamily="18" charset="0"/>
+                        <a:cs typeface="CMU Serif Roman" panose="02000603000000000000" pitchFamily="2" charset="0"/>
+                      </a:rPr>
+                      <m:t>×</m:t>
+                    </m:r>
+                  </m:oMath>
+                </a14:m>
+                <a:r>
+                  <a:rPr lang="en-GB" sz="570" b="1" dirty="0">
+                    <a:latin typeface="CMU Serif Roman" panose="02000603000000000000" pitchFamily="2" charset="0"/>
+                    <a:ea typeface="CMU Serif Roman" panose="02000603000000000000" pitchFamily="2" charset="0"/>
+                    <a:cs typeface="CMU Serif Roman" panose="02000603000000000000" pitchFamily="2" charset="0"/>
+                  </a:rPr>
+                  <a:t>10</a:t>
+                </a:r>
+                <a:r>
+                  <a:rPr lang="en-GB" sz="570" b="1" baseline="30000" dirty="0">
+                    <a:latin typeface="CMU Serif Roman" panose="02000603000000000000" pitchFamily="2" charset="0"/>
+                    <a:ea typeface="CMU Serif Roman" panose="02000603000000000000" pitchFamily="2" charset="0"/>
+                    <a:cs typeface="CMU Serif Roman" panose="02000603000000000000" pitchFamily="2" charset="0"/>
+                  </a:rPr>
+                  <a:t>-5</a:t>
+                </a:r>
+                <a:endParaRPr lang="en-GB" sz="570" b="1" dirty="0">
+                  <a:latin typeface="CMU Serif Roman" panose="02000603000000000000" pitchFamily="2" charset="0"/>
+                  <a:ea typeface="CMU Serif Roman" panose="02000603000000000000" pitchFamily="2" charset="0"/>
+                  <a:cs typeface="CMU Serif Roman" panose="02000603000000000000" pitchFamily="2" charset="0"/>
+                </a:endParaRPr>
+              </a:p>
+            </p:txBody>
+          </p:sp>
+        </mc:Choice>
+        <mc:Fallback>
+          <p:sp>
+            <p:nvSpPr>
+              <p:cNvPr id="7" name="TextBox 6">
+                <a:extLst>
+                  <a:ext uri="{FF2B5EF4-FFF2-40B4-BE49-F238E27FC236}">
+                    <a16:creationId xmlns:a16="http://schemas.microsoft.com/office/drawing/2014/main" id="{5857D9CB-E354-D748-9081-DEB2F09607CE}"/>
+                  </a:ext>
+                </a:extLst>
+              </p:cNvPr>
+              <p:cNvSpPr txBox="1">
+                <a:spLocks noRot="1" noChangeAspect="1" noMove="1" noResize="1" noEditPoints="1" noAdjustHandles="1" noChangeArrowheads="1" noChangeShapeType="1" noTextEdit="1"/>
+              </p:cNvSpPr>
+              <p:nvPr/>
+            </p:nvSpPr>
+            <p:spPr>
+              <a:xfrm>
+                <a:off x="6146180" y="5224173"/>
+                <a:ext cx="708848" cy="184666"/>
+              </a:xfrm>
+              <a:prstGeom prst="rect">
+                <a:avLst/>
+              </a:prstGeom>
+              <a:blipFill>
+                <a:blip r:embed="rId7"/>
+                <a:stretch>
+                  <a:fillRect/>
+                </a:stretch>
+              </a:blipFill>
+            </p:spPr>
+            <p:txBody>
+              <a:bodyPr/>
+              <a:lstStyle/>
+              <a:p>
+                <a:r>
+                  <a:rPr lang="en-GB">
+                    <a:noFill/>
+                  </a:rPr>
+                  <a:t> </a:t>
+                </a:r>
+              </a:p>
+            </p:txBody>
+          </p:sp>
+        </mc:Fallback>
+      </mc:AlternateContent>
+      <p:sp>
+        <p:nvSpPr>
+          <p:cNvPr id="8" name="Rectangle 7">
+            <a:extLst>
+              <a:ext uri="{FF2B5EF4-FFF2-40B4-BE49-F238E27FC236}">
+                <a16:creationId xmlns:a16="http://schemas.microsoft.com/office/drawing/2014/main" id="{8080E081-D2AA-E34E-B121-37535DEDF32D}"/>
+              </a:ext>
+            </a:extLst>
+          </p:cNvPr>
+          <p:cNvSpPr/>
+          <p:nvPr/>
+        </p:nvSpPr>
+        <p:spPr>
+          <a:xfrm>
+            <a:off x="3655983" y="5290382"/>
+            <a:ext cx="171436" cy="86090"/>
+          </a:xfrm>
+          <a:prstGeom prst="rect">
+            <a:avLst/>
+          </a:prstGeom>
+          <a:solidFill>
+            <a:schemeClr val="bg1"/>
+          </a:solidFill>
+          <a:ln>
+            <a:noFill/>
+          </a:ln>
+        </p:spPr>
+        <p:style>
+          <a:lnRef idx="2">
+            <a:schemeClr val="accent1">
+              <a:shade val="50000"/>
+            </a:schemeClr>
+          </a:lnRef>
+          <a:fillRef idx="1">
+            <a:schemeClr val="accent1"/>
+          </a:fillRef>
+          <a:effectRef idx="0">
+            <a:schemeClr val="accent1"/>
+          </a:effectRef>
+          <a:fontRef idx="minor">
+            <a:schemeClr val="lt1"/>
+          </a:fontRef>
+        </p:style>
+        <p:txBody>
+          <a:bodyPr rtlCol="0" anchor="ctr"/>
+          <a:lstStyle/>
+          <a:p>
+            <a:pPr algn="ctr"/>
+            <a:endParaRPr lang="en-GB" dirty="0"/>
+          </a:p>
+        </p:txBody>
+      </p:sp>
+      <p:sp>
+        <p:nvSpPr>
+          <p:cNvPr id="10" name="Rectangle 9">
+            <a:extLst>
+              <a:ext uri="{FF2B5EF4-FFF2-40B4-BE49-F238E27FC236}">
+                <a16:creationId xmlns:a16="http://schemas.microsoft.com/office/drawing/2014/main" id="{63152B65-AB91-0942-8921-CE9D67F51AF8}"/>
+              </a:ext>
+            </a:extLst>
+          </p:cNvPr>
+          <p:cNvSpPr/>
+          <p:nvPr/>
+        </p:nvSpPr>
+        <p:spPr>
+          <a:xfrm>
+            <a:off x="5095075" y="5316506"/>
+            <a:ext cx="171436" cy="86090"/>
+          </a:xfrm>
+          <a:prstGeom prst="rect">
+            <a:avLst/>
+          </a:prstGeom>
+          <a:solidFill>
+            <a:schemeClr val="bg1"/>
+          </a:solidFill>
+          <a:ln>
+            <a:noFill/>
+          </a:ln>
+        </p:spPr>
+        <p:style>
+          <a:lnRef idx="2">
+            <a:schemeClr val="accent1">
+              <a:shade val="50000"/>
+            </a:schemeClr>
+          </a:lnRef>
+          <a:fillRef idx="1">
+            <a:schemeClr val="accent1"/>
+          </a:fillRef>
+          <a:effectRef idx="0">
+            <a:schemeClr val="accent1"/>
+          </a:effectRef>
+          <a:fontRef idx="minor">
+            <a:schemeClr val="lt1"/>
+          </a:fontRef>
+        </p:style>
+        <p:txBody>
+          <a:bodyPr rtlCol="0" anchor="ctr"/>
+          <a:lstStyle/>
+          <a:p>
+            <a:pPr algn="ctr"/>
+            <a:endParaRPr lang="en-GB" dirty="0"/>
+          </a:p>
+        </p:txBody>
+      </p:sp>
+      <p:sp>
+        <p:nvSpPr>
+          <p:cNvPr id="11" name="Rectangle 10">
+            <a:extLst>
+              <a:ext uri="{FF2B5EF4-FFF2-40B4-BE49-F238E27FC236}">
+                <a16:creationId xmlns:a16="http://schemas.microsoft.com/office/drawing/2014/main" id="{6549D215-32BC-1F42-868C-AB3DF8226F14}"/>
+              </a:ext>
+            </a:extLst>
+          </p:cNvPr>
+          <p:cNvSpPr/>
+          <p:nvPr/>
+        </p:nvSpPr>
+        <p:spPr>
+          <a:xfrm>
+            <a:off x="5865935" y="5263479"/>
+            <a:ext cx="171436" cy="86090"/>
+          </a:xfrm>
+          <a:prstGeom prst="rect">
+            <a:avLst/>
+          </a:prstGeom>
+          <a:solidFill>
+            <a:schemeClr val="bg1"/>
+          </a:solidFill>
+          <a:ln>
+            <a:noFill/>
+          </a:ln>
+        </p:spPr>
+        <p:style>
+          <a:lnRef idx="2">
+            <a:schemeClr val="accent1">
+              <a:shade val="50000"/>
+            </a:schemeClr>
+          </a:lnRef>
+          <a:fillRef idx="1">
+            <a:schemeClr val="accent1"/>
+          </a:fillRef>
+          <a:effectRef idx="0">
+            <a:schemeClr val="accent1"/>
+          </a:effectRef>
+          <a:fontRef idx="minor">
+            <a:schemeClr val="lt1"/>
+          </a:fontRef>
+        </p:style>
+        <p:txBody>
+          <a:bodyPr rtlCol="0" anchor="ctr"/>
+          <a:lstStyle/>
+          <a:p>
+            <a:pPr algn="ctr"/>
+            <a:endParaRPr lang="en-GB" dirty="0"/>
+          </a:p>
+        </p:txBody>
+      </p:sp>
+      <p:sp>
+        <p:nvSpPr>
+          <p:cNvPr id="12" name="Rectangle 11">
+            <a:extLst>
+              <a:ext uri="{FF2B5EF4-FFF2-40B4-BE49-F238E27FC236}">
+                <a16:creationId xmlns:a16="http://schemas.microsoft.com/office/drawing/2014/main" id="{47BAB0F7-905D-5845-BFA7-8D617E0C2892}"/>
+              </a:ext>
+            </a:extLst>
+          </p:cNvPr>
+          <p:cNvSpPr/>
+          <p:nvPr/>
+        </p:nvSpPr>
+        <p:spPr>
+          <a:xfrm rot="16200000">
+            <a:off x="3021027" y="4802702"/>
+            <a:ext cx="171436" cy="86090"/>
+          </a:xfrm>
+          <a:prstGeom prst="rect">
+            <a:avLst/>
+          </a:prstGeom>
+          <a:solidFill>
+            <a:schemeClr val="bg1"/>
+          </a:solidFill>
+          <a:ln>
+            <a:noFill/>
+          </a:ln>
+        </p:spPr>
+        <p:style>
+          <a:lnRef idx="2">
+            <a:schemeClr val="accent1">
+              <a:shade val="50000"/>
+            </a:schemeClr>
+          </a:lnRef>
+          <a:fillRef idx="1">
+            <a:schemeClr val="accent1"/>
+          </a:fillRef>
+          <a:effectRef idx="0">
+            <a:schemeClr val="accent1"/>
+          </a:effectRef>
+          <a:fontRef idx="minor">
+            <a:schemeClr val="lt1"/>
+          </a:fontRef>
+        </p:style>
+        <p:txBody>
+          <a:bodyPr rtlCol="0" anchor="ctr"/>
+          <a:lstStyle/>
+          <a:p>
+            <a:pPr algn="ctr"/>
+            <a:endParaRPr lang="en-GB" dirty="0"/>
+          </a:p>
+        </p:txBody>
+      </p:sp>
+      <p:sp>
+        <p:nvSpPr>
+          <p:cNvPr id="13" name="Rectangle 12">
+            <a:extLst>
+              <a:ext uri="{FF2B5EF4-FFF2-40B4-BE49-F238E27FC236}">
+                <a16:creationId xmlns:a16="http://schemas.microsoft.com/office/drawing/2014/main" id="{0214779E-B7F1-7146-803A-C94B2480D04B}"/>
+              </a:ext>
+            </a:extLst>
+          </p:cNvPr>
+          <p:cNvSpPr/>
+          <p:nvPr/>
+        </p:nvSpPr>
+        <p:spPr>
+          <a:xfrm rot="16200000">
+            <a:off x="3064072" y="4273733"/>
+            <a:ext cx="171436" cy="86090"/>
+          </a:xfrm>
+          <a:prstGeom prst="rect">
+            <a:avLst/>
+          </a:prstGeom>
+          <a:solidFill>
+            <a:schemeClr val="bg1"/>
+          </a:solidFill>
+          <a:ln>
+            <a:noFill/>
+          </a:ln>
+        </p:spPr>
+        <p:style>
+          <a:lnRef idx="2">
+            <a:schemeClr val="accent1">
+              <a:shade val="50000"/>
+            </a:schemeClr>
+          </a:lnRef>
+          <a:fillRef idx="1">
+            <a:schemeClr val="accent1"/>
+          </a:fillRef>
+          <a:effectRef idx="0">
+            <a:schemeClr val="accent1"/>
+          </a:effectRef>
+          <a:fontRef idx="minor">
+            <a:schemeClr val="lt1"/>
+          </a:fontRef>
+        </p:style>
+        <p:txBody>
+          <a:bodyPr rtlCol="0" anchor="ctr"/>
+          <a:lstStyle/>
+          <a:p>
+            <a:pPr algn="ctr"/>
+            <a:endParaRPr lang="en-GB" dirty="0"/>
+          </a:p>
+        </p:txBody>
+      </p:sp>
+      <p:sp>
+        <p:nvSpPr>
+          <p:cNvPr id="14" name="Rectangle 13">
+            <a:extLst>
+              <a:ext uri="{FF2B5EF4-FFF2-40B4-BE49-F238E27FC236}">
+                <a16:creationId xmlns:a16="http://schemas.microsoft.com/office/drawing/2014/main" id="{6BF1B32F-E1DE-E547-98B4-8BAD3FD42AE9}"/>
+              </a:ext>
+            </a:extLst>
+          </p:cNvPr>
+          <p:cNvSpPr/>
+          <p:nvPr/>
+        </p:nvSpPr>
+        <p:spPr>
+          <a:xfrm rot="16200000">
+            <a:off x="3021027" y="3706486"/>
+            <a:ext cx="171436" cy="86090"/>
+          </a:xfrm>
+          <a:prstGeom prst="rect">
+            <a:avLst/>
+          </a:prstGeom>
+          <a:solidFill>
+            <a:schemeClr val="bg1"/>
+          </a:solidFill>
+          <a:ln>
+            <a:noFill/>
+          </a:ln>
+        </p:spPr>
+        <p:style>
+          <a:lnRef idx="2">
+            <a:schemeClr val="accent1">
+              <a:shade val="50000"/>
+            </a:schemeClr>
+          </a:lnRef>
+          <a:fillRef idx="1">
+            <a:schemeClr val="accent1"/>
+          </a:fillRef>
+          <a:effectRef idx="0">
+            <a:schemeClr val="accent1"/>
+          </a:effectRef>
+          <a:fontRef idx="minor">
+            <a:schemeClr val="lt1"/>
+          </a:fontRef>
+        </p:style>
+        <p:txBody>
+          <a:bodyPr rtlCol="0" anchor="ctr"/>
+          <a:lstStyle/>
+          <a:p>
+            <a:pPr algn="ctr"/>
+            <a:endParaRPr lang="en-GB" dirty="0"/>
+          </a:p>
+        </p:txBody>
+      </p:sp>
+      <p:sp>
+        <p:nvSpPr>
+          <p:cNvPr id="15" name="Rectangle 14">
+            <a:extLst>
+              <a:ext uri="{FF2B5EF4-FFF2-40B4-BE49-F238E27FC236}">
+                <a16:creationId xmlns:a16="http://schemas.microsoft.com/office/drawing/2014/main" id="{0B5B6335-25B6-5D4E-91F9-FB1D757D5E9F}"/>
+              </a:ext>
+            </a:extLst>
+          </p:cNvPr>
+          <p:cNvSpPr/>
+          <p:nvPr/>
+        </p:nvSpPr>
+        <p:spPr>
+          <a:xfrm rot="16200000">
+            <a:off x="2977982" y="3177516"/>
+            <a:ext cx="171436" cy="86090"/>
+          </a:xfrm>
+          <a:prstGeom prst="rect">
+            <a:avLst/>
+          </a:prstGeom>
+          <a:solidFill>
+            <a:schemeClr val="bg1"/>
+          </a:solidFill>
+          <a:ln>
+            <a:noFill/>
+          </a:ln>
+        </p:spPr>
+        <p:style>
+          <a:lnRef idx="2">
+            <a:schemeClr val="accent1">
+              <a:shade val="50000"/>
+            </a:schemeClr>
+          </a:lnRef>
+          <a:fillRef idx="1">
+            <a:schemeClr val="accent1"/>
+          </a:fillRef>
+          <a:effectRef idx="0">
+            <a:schemeClr val="accent1"/>
+          </a:effectRef>
+          <a:fontRef idx="minor">
+            <a:schemeClr val="lt1"/>
+          </a:fontRef>
+        </p:style>
+        <p:txBody>
+          <a:bodyPr rtlCol="0" anchor="ctr"/>
+          <a:lstStyle/>
+          <a:p>
+            <a:pPr algn="ctr"/>
+            <a:endParaRPr lang="en-GB" dirty="0"/>
+          </a:p>
+        </p:txBody>
+      </p:sp>
+      <p:sp>
+        <p:nvSpPr>
+          <p:cNvPr id="6" name="TextBox 5">
+            <a:extLst>
+              <a:ext uri="{FF2B5EF4-FFF2-40B4-BE49-F238E27FC236}">
+                <a16:creationId xmlns:a16="http://schemas.microsoft.com/office/drawing/2014/main" id="{5FF0D894-5645-BA42-924D-1E1357A72C36}"/>
+              </a:ext>
+            </a:extLst>
+          </p:cNvPr>
+          <p:cNvSpPr txBox="1"/>
+          <p:nvPr/>
+        </p:nvSpPr>
+        <p:spPr>
+          <a:xfrm>
+            <a:off x="3553354" y="5306524"/>
+            <a:ext cx="336952" cy="246221"/>
+          </a:xfrm>
+          <a:prstGeom prst="rect">
+            <a:avLst/>
+          </a:prstGeom>
+          <a:noFill/>
+        </p:spPr>
+        <p:txBody>
+          <a:bodyPr wrap="none" rtlCol="0">
+            <a:spAutoFit/>
+          </a:bodyPr>
+          <a:lstStyle/>
+          <a:p>
+            <a:r>
+              <a:rPr lang="en-GB" sz="1000" b="1" dirty="0">
+                <a:latin typeface="CMU Serif Roman" panose="02000603000000000000" pitchFamily="2" charset="0"/>
+                <a:ea typeface="CMU Serif Roman" panose="02000603000000000000" pitchFamily="2" charset="0"/>
+                <a:cs typeface="CMU Serif Roman" panose="02000603000000000000" pitchFamily="2" charset="0"/>
+              </a:rPr>
+              <a:t>Ω</a:t>
+            </a:r>
+            <a:r>
+              <a:rPr lang="en-GB" sz="1000" b="1" baseline="-25000" dirty="0">
+                <a:latin typeface="CMU Serif Roman" panose="02000603000000000000" pitchFamily="2" charset="0"/>
+                <a:ea typeface="CMU Serif Roman" panose="02000603000000000000" pitchFamily="2" charset="0"/>
+                <a:cs typeface="CMU Serif Roman" panose="02000603000000000000" pitchFamily="2" charset="0"/>
+              </a:rPr>
+              <a:t>Λ</a:t>
+            </a:r>
+            <a:endParaRPr lang="en-GB" sz="1100" b="1" dirty="0">
+              <a:latin typeface="CMU Serif Roman" panose="02000603000000000000" pitchFamily="2" charset="0"/>
+              <a:ea typeface="CMU Serif Roman" panose="02000603000000000000" pitchFamily="2" charset="0"/>
+              <a:cs typeface="CMU Serif Roman" panose="02000603000000000000" pitchFamily="2" charset="0"/>
+            </a:endParaRPr>
+          </a:p>
+        </p:txBody>
+      </p:sp>
+      <p:sp>
+        <p:nvSpPr>
+          <p:cNvPr id="16" name="TextBox 15">
+            <a:extLst>
+              <a:ext uri="{FF2B5EF4-FFF2-40B4-BE49-F238E27FC236}">
+                <a16:creationId xmlns:a16="http://schemas.microsoft.com/office/drawing/2014/main" id="{E2CE5670-3D2D-1E4C-9651-FA8F6A3EBCF5}"/>
+              </a:ext>
+            </a:extLst>
+          </p:cNvPr>
+          <p:cNvSpPr txBox="1"/>
+          <p:nvPr/>
+        </p:nvSpPr>
+        <p:spPr>
+          <a:xfrm>
+            <a:off x="4327175" y="5306524"/>
+            <a:ext cx="322524" cy="246221"/>
+          </a:xfrm>
+          <a:prstGeom prst="rect">
+            <a:avLst/>
+          </a:prstGeom>
+          <a:noFill/>
+        </p:spPr>
+        <p:txBody>
+          <a:bodyPr wrap="none" rtlCol="0">
+            <a:spAutoFit/>
+          </a:bodyPr>
+          <a:lstStyle/>
+          <a:p>
+            <a:r>
+              <a:rPr lang="en-GB" sz="1000" b="1" dirty="0" err="1">
+                <a:latin typeface="CMU Serif Roman" panose="02000603000000000000" pitchFamily="2" charset="0"/>
+                <a:ea typeface="CMU Serif Roman" panose="02000603000000000000" pitchFamily="2" charset="0"/>
+                <a:cs typeface="CMU Serif Roman" panose="02000603000000000000" pitchFamily="2" charset="0"/>
+              </a:rPr>
+              <a:t>Ω</a:t>
+            </a:r>
+            <a:r>
+              <a:rPr lang="en-GB" sz="1000" b="1" i="1" baseline="-25000" dirty="0" err="1">
+                <a:latin typeface="CMU Serif Roman" panose="02000603000000000000" pitchFamily="2" charset="0"/>
+                <a:ea typeface="CMU Serif Roman" panose="02000603000000000000" pitchFamily="2" charset="0"/>
+                <a:cs typeface="CMU Serif Roman" panose="02000603000000000000" pitchFamily="2" charset="0"/>
+              </a:rPr>
+              <a:t>k</a:t>
+            </a:r>
+            <a:endParaRPr lang="en-GB" sz="1100" b="1" i="1" dirty="0">
+              <a:latin typeface="CMU Serif Roman" panose="02000603000000000000" pitchFamily="2" charset="0"/>
+              <a:ea typeface="CMU Serif Roman" panose="02000603000000000000" pitchFamily="2" charset="0"/>
+              <a:cs typeface="CMU Serif Roman" panose="02000603000000000000" pitchFamily="2" charset="0"/>
+            </a:endParaRPr>
+          </a:p>
+        </p:txBody>
+      </p:sp>
+      <p:sp>
+        <p:nvSpPr>
+          <p:cNvPr id="17" name="TextBox 16">
+            <a:extLst>
+              <a:ext uri="{FF2B5EF4-FFF2-40B4-BE49-F238E27FC236}">
+                <a16:creationId xmlns:a16="http://schemas.microsoft.com/office/drawing/2014/main" id="{F94FAA1A-F817-C742-B698-01C1115C4808}"/>
+              </a:ext>
+            </a:extLst>
+          </p:cNvPr>
+          <p:cNvSpPr txBox="1"/>
+          <p:nvPr/>
+        </p:nvSpPr>
+        <p:spPr>
+          <a:xfrm>
+            <a:off x="5025141" y="5315850"/>
+            <a:ext cx="357790" cy="246221"/>
+          </a:xfrm>
+          <a:prstGeom prst="rect">
+            <a:avLst/>
+          </a:prstGeom>
+          <a:noFill/>
+        </p:spPr>
+        <p:txBody>
+          <a:bodyPr wrap="none" rtlCol="0">
+            <a:spAutoFit/>
+          </a:bodyPr>
+          <a:lstStyle/>
+          <a:p>
+            <a:r>
+              <a:rPr lang="en-GB" sz="1000" b="1" dirty="0" err="1">
+                <a:latin typeface="CMU Serif Roman" panose="02000603000000000000" pitchFamily="2" charset="0"/>
+                <a:ea typeface="CMU Serif Roman" panose="02000603000000000000" pitchFamily="2" charset="0"/>
+                <a:cs typeface="CMU Serif Roman" panose="02000603000000000000" pitchFamily="2" charset="0"/>
+              </a:rPr>
+              <a:t>Ω</a:t>
+            </a:r>
+            <a:r>
+              <a:rPr lang="en-GB" sz="1000" b="1" i="1" baseline="-25000" dirty="0" err="1">
+                <a:latin typeface="CMU Serif Roman" panose="02000603000000000000" pitchFamily="2" charset="0"/>
+                <a:ea typeface="CMU Serif Roman" panose="02000603000000000000" pitchFamily="2" charset="0"/>
+                <a:cs typeface="CMU Serif Roman" panose="02000603000000000000" pitchFamily="2" charset="0"/>
+              </a:rPr>
+              <a:t>m</a:t>
+            </a:r>
+            <a:endParaRPr lang="en-GB" sz="1100" b="1" i="1" dirty="0">
+              <a:latin typeface="CMU Serif Roman" panose="02000603000000000000" pitchFamily="2" charset="0"/>
+              <a:ea typeface="CMU Serif Roman" panose="02000603000000000000" pitchFamily="2" charset="0"/>
+              <a:cs typeface="CMU Serif Roman" panose="02000603000000000000" pitchFamily="2" charset="0"/>
+            </a:endParaRPr>
+          </a:p>
+        </p:txBody>
+      </p:sp>
+      <p:sp>
+        <p:nvSpPr>
+          <p:cNvPr id="18" name="TextBox 17">
+            <a:extLst>
+              <a:ext uri="{FF2B5EF4-FFF2-40B4-BE49-F238E27FC236}">
+                <a16:creationId xmlns:a16="http://schemas.microsoft.com/office/drawing/2014/main" id="{D5E4D133-A449-AD4F-A555-A8537979510D}"/>
+              </a:ext>
+            </a:extLst>
+          </p:cNvPr>
+          <p:cNvSpPr txBox="1"/>
+          <p:nvPr/>
+        </p:nvSpPr>
+        <p:spPr>
+          <a:xfrm>
+            <a:off x="5770854" y="5312113"/>
+            <a:ext cx="320922" cy="246221"/>
+          </a:xfrm>
+          <a:prstGeom prst="rect">
+            <a:avLst/>
+          </a:prstGeom>
+          <a:noFill/>
+        </p:spPr>
+        <p:txBody>
+          <a:bodyPr wrap="none" rtlCol="0">
+            <a:spAutoFit/>
+          </a:bodyPr>
+          <a:lstStyle/>
+          <a:p>
+            <a:r>
+              <a:rPr lang="en-GB" sz="1000" b="1" dirty="0" err="1">
+                <a:latin typeface="CMU Serif Roman" panose="02000603000000000000" pitchFamily="2" charset="0"/>
+                <a:ea typeface="CMU Serif Roman" panose="02000603000000000000" pitchFamily="2" charset="0"/>
+                <a:cs typeface="CMU Serif Roman" panose="02000603000000000000" pitchFamily="2" charset="0"/>
+              </a:rPr>
+              <a:t>Ω</a:t>
+            </a:r>
+            <a:r>
+              <a:rPr lang="en-GB" sz="1000" b="1" i="1" baseline="-25000" dirty="0" err="1">
+                <a:latin typeface="CMU Serif Roman" panose="02000603000000000000" pitchFamily="2" charset="0"/>
+                <a:ea typeface="CMU Serif Roman" panose="02000603000000000000" pitchFamily="2" charset="0"/>
+                <a:cs typeface="CMU Serif Roman" panose="02000603000000000000" pitchFamily="2" charset="0"/>
+              </a:rPr>
+              <a:t>r</a:t>
+            </a:r>
+            <a:endParaRPr lang="en-GB" sz="1100" b="1" i="1" dirty="0">
+              <a:latin typeface="CMU Serif Roman" panose="02000603000000000000" pitchFamily="2" charset="0"/>
+              <a:ea typeface="CMU Serif Roman" panose="02000603000000000000" pitchFamily="2" charset="0"/>
+              <a:cs typeface="CMU Serif Roman" panose="02000603000000000000" pitchFamily="2" charset="0"/>
+            </a:endParaRPr>
+          </a:p>
+        </p:txBody>
+      </p:sp>
+      <p:sp>
+        <p:nvSpPr>
+          <p:cNvPr id="19" name="TextBox 18">
+            <a:extLst>
+              <a:ext uri="{FF2B5EF4-FFF2-40B4-BE49-F238E27FC236}">
+                <a16:creationId xmlns:a16="http://schemas.microsoft.com/office/drawing/2014/main" id="{804A1C1D-DCF0-F943-942C-2897DDB569AF}"/>
+              </a:ext>
+            </a:extLst>
+          </p:cNvPr>
+          <p:cNvSpPr txBox="1"/>
+          <p:nvPr/>
+        </p:nvSpPr>
+        <p:spPr>
+          <a:xfrm rot="16200000">
+            <a:off x="2792067" y="4732348"/>
+            <a:ext cx="457176" cy="246221"/>
+          </a:xfrm>
+          <a:prstGeom prst="rect">
+            <a:avLst/>
+          </a:prstGeom>
+          <a:noFill/>
+        </p:spPr>
+        <p:txBody>
+          <a:bodyPr wrap="none" rtlCol="0">
+            <a:spAutoFit/>
+          </a:bodyPr>
+          <a:lstStyle/>
+          <a:p>
+            <a:r>
+              <a:rPr lang="en-GB" sz="1000" b="1" dirty="0" err="1">
+                <a:latin typeface="CMU Serif Roman" panose="02000603000000000000" pitchFamily="2" charset="0"/>
+                <a:ea typeface="CMU Serif Roman" panose="02000603000000000000" pitchFamily="2" charset="0"/>
+                <a:cs typeface="CMU Serif Roman" panose="02000603000000000000" pitchFamily="2" charset="0"/>
+              </a:rPr>
+              <a:t>L</a:t>
+            </a:r>
+            <a:r>
+              <a:rPr lang="en-GB" sz="1000" b="1" i="1" baseline="-25000" dirty="0" err="1">
+                <a:latin typeface="CMU Serif Roman" panose="02000603000000000000" pitchFamily="2" charset="0"/>
+                <a:ea typeface="CMU Serif Roman" panose="02000603000000000000" pitchFamily="2" charset="0"/>
+                <a:cs typeface="CMU Serif Roman" panose="02000603000000000000" pitchFamily="2" charset="0"/>
+              </a:rPr>
+              <a:t>peak</a:t>
+            </a:r>
+            <a:endParaRPr lang="en-GB" sz="1100" b="1" i="1" dirty="0">
+              <a:latin typeface="CMU Serif Roman" panose="02000603000000000000" pitchFamily="2" charset="0"/>
+              <a:ea typeface="CMU Serif Roman" panose="02000603000000000000" pitchFamily="2" charset="0"/>
+              <a:cs typeface="CMU Serif Roman" panose="02000603000000000000" pitchFamily="2" charset="0"/>
+            </a:endParaRPr>
+          </a:p>
+        </p:txBody>
+      </p:sp>
+      <p:sp>
+        <p:nvSpPr>
+          <p:cNvPr id="20" name="TextBox 19">
+            <a:extLst>
+              <a:ext uri="{FF2B5EF4-FFF2-40B4-BE49-F238E27FC236}">
+                <a16:creationId xmlns:a16="http://schemas.microsoft.com/office/drawing/2014/main" id="{7BC8489C-7A9D-1446-90B7-D45E72801E23}"/>
+              </a:ext>
+            </a:extLst>
+          </p:cNvPr>
+          <p:cNvSpPr txBox="1"/>
+          <p:nvPr/>
+        </p:nvSpPr>
+        <p:spPr>
+          <a:xfrm rot="16200000">
+            <a:off x="2860195" y="4164532"/>
+            <a:ext cx="320922" cy="246221"/>
+          </a:xfrm>
+          <a:prstGeom prst="rect">
+            <a:avLst/>
+          </a:prstGeom>
+          <a:noFill/>
+        </p:spPr>
+        <p:txBody>
+          <a:bodyPr wrap="none" rtlCol="0">
+            <a:spAutoFit/>
+          </a:bodyPr>
+          <a:lstStyle/>
+          <a:p>
+            <a:r>
+              <a:rPr lang="en-GB" sz="1000" b="1" dirty="0" err="1">
+                <a:latin typeface="CMU Serif Roman" panose="02000603000000000000" pitchFamily="2" charset="0"/>
+                <a:ea typeface="CMU Serif Roman" panose="02000603000000000000" pitchFamily="2" charset="0"/>
+                <a:cs typeface="CMU Serif Roman" panose="02000603000000000000" pitchFamily="2" charset="0"/>
+              </a:rPr>
+              <a:t>Ω</a:t>
+            </a:r>
+            <a:r>
+              <a:rPr lang="en-GB" sz="1000" b="1" i="1" baseline="-25000" dirty="0" err="1">
+                <a:latin typeface="CMU Serif Roman" panose="02000603000000000000" pitchFamily="2" charset="0"/>
+                <a:ea typeface="CMU Serif Roman" panose="02000603000000000000" pitchFamily="2" charset="0"/>
+                <a:cs typeface="CMU Serif Roman" panose="02000603000000000000" pitchFamily="2" charset="0"/>
+              </a:rPr>
+              <a:t>r</a:t>
+            </a:r>
+            <a:endParaRPr lang="en-GB" sz="1100" b="1" i="1" dirty="0">
+              <a:latin typeface="CMU Serif Roman" panose="02000603000000000000" pitchFamily="2" charset="0"/>
+              <a:ea typeface="CMU Serif Roman" panose="02000603000000000000" pitchFamily="2" charset="0"/>
+              <a:cs typeface="CMU Serif Roman" panose="02000603000000000000" pitchFamily="2" charset="0"/>
+            </a:endParaRPr>
+          </a:p>
+        </p:txBody>
+      </p:sp>
+      <p:sp>
+        <p:nvSpPr>
+          <p:cNvPr id="21" name="TextBox 20">
+            <a:extLst>
+              <a:ext uri="{FF2B5EF4-FFF2-40B4-BE49-F238E27FC236}">
+                <a16:creationId xmlns:a16="http://schemas.microsoft.com/office/drawing/2014/main" id="{E4F5C7E7-5CFC-7748-88EF-5EE894FDF23D}"/>
+              </a:ext>
+            </a:extLst>
+          </p:cNvPr>
+          <p:cNvSpPr txBox="1"/>
+          <p:nvPr/>
+        </p:nvSpPr>
+        <p:spPr>
+          <a:xfrm rot="16200000">
+            <a:off x="2837890" y="3646409"/>
+            <a:ext cx="357790" cy="246221"/>
+          </a:xfrm>
+          <a:prstGeom prst="rect">
+            <a:avLst/>
+          </a:prstGeom>
+          <a:noFill/>
+        </p:spPr>
+        <p:txBody>
+          <a:bodyPr wrap="none" rtlCol="0">
+            <a:spAutoFit/>
+          </a:bodyPr>
+          <a:lstStyle/>
+          <a:p>
+            <a:r>
+              <a:rPr lang="en-GB" sz="1000" b="1" dirty="0" err="1">
+                <a:latin typeface="CMU Serif Roman" panose="02000603000000000000" pitchFamily="2" charset="0"/>
+                <a:ea typeface="CMU Serif Roman" panose="02000603000000000000" pitchFamily="2" charset="0"/>
+                <a:cs typeface="CMU Serif Roman" panose="02000603000000000000" pitchFamily="2" charset="0"/>
+              </a:rPr>
+              <a:t>Ω</a:t>
+            </a:r>
+            <a:r>
+              <a:rPr lang="en-GB" sz="1000" b="1" i="1" baseline="-25000" dirty="0" err="1">
+                <a:latin typeface="CMU Serif Roman" panose="02000603000000000000" pitchFamily="2" charset="0"/>
+                <a:ea typeface="CMU Serif Roman" panose="02000603000000000000" pitchFamily="2" charset="0"/>
+                <a:cs typeface="CMU Serif Roman" panose="02000603000000000000" pitchFamily="2" charset="0"/>
+              </a:rPr>
+              <a:t>m</a:t>
+            </a:r>
+            <a:endParaRPr lang="en-GB" sz="1100" b="1" i="1" dirty="0">
+              <a:latin typeface="CMU Serif Roman" panose="02000603000000000000" pitchFamily="2" charset="0"/>
+              <a:ea typeface="CMU Serif Roman" panose="02000603000000000000" pitchFamily="2" charset="0"/>
+              <a:cs typeface="CMU Serif Roman" panose="02000603000000000000" pitchFamily="2" charset="0"/>
+            </a:endParaRPr>
+          </a:p>
+        </p:txBody>
+      </p:sp>
+      <p:sp>
+        <p:nvSpPr>
+          <p:cNvPr id="22" name="TextBox 21">
+            <a:extLst>
+              <a:ext uri="{FF2B5EF4-FFF2-40B4-BE49-F238E27FC236}">
+                <a16:creationId xmlns:a16="http://schemas.microsoft.com/office/drawing/2014/main" id="{DD1838A6-28C0-0F42-AC9B-CF7824A4A512}"/>
+              </a:ext>
+            </a:extLst>
+          </p:cNvPr>
+          <p:cNvSpPr txBox="1"/>
+          <p:nvPr/>
+        </p:nvSpPr>
+        <p:spPr>
+          <a:xfrm rot="16200000">
+            <a:off x="2865418" y="3089430"/>
+            <a:ext cx="322524" cy="246221"/>
+          </a:xfrm>
+          <a:prstGeom prst="rect">
+            <a:avLst/>
+          </a:prstGeom>
+          <a:noFill/>
+        </p:spPr>
+        <p:txBody>
+          <a:bodyPr wrap="none" rtlCol="0">
+            <a:spAutoFit/>
+          </a:bodyPr>
+          <a:lstStyle/>
+          <a:p>
+            <a:r>
+              <a:rPr lang="en-GB" sz="1000" b="1" dirty="0" err="1">
+                <a:latin typeface="CMU Serif Roman" panose="02000603000000000000" pitchFamily="2" charset="0"/>
+                <a:ea typeface="CMU Serif Roman" panose="02000603000000000000" pitchFamily="2" charset="0"/>
+                <a:cs typeface="CMU Serif Roman" panose="02000603000000000000" pitchFamily="2" charset="0"/>
+              </a:rPr>
+              <a:t>Ω</a:t>
+            </a:r>
+            <a:r>
+              <a:rPr lang="en-GB" sz="1000" b="1" i="1" baseline="-25000" dirty="0" err="1">
+                <a:latin typeface="CMU Serif Roman" panose="02000603000000000000" pitchFamily="2" charset="0"/>
+                <a:ea typeface="CMU Serif Roman" panose="02000603000000000000" pitchFamily="2" charset="0"/>
+                <a:cs typeface="CMU Serif Roman" panose="02000603000000000000" pitchFamily="2" charset="0"/>
+              </a:rPr>
+              <a:t>k</a:t>
+            </a:r>
+            <a:endParaRPr lang="en-GB" sz="1100" b="1" i="1" dirty="0">
+              <a:latin typeface="CMU Serif Roman" panose="02000603000000000000" pitchFamily="2" charset="0"/>
+              <a:ea typeface="CMU Serif Roman" panose="02000603000000000000" pitchFamily="2" charset="0"/>
+              <a:cs typeface="CMU Serif Roman" panose="02000603000000000000" pitchFamily="2" charset="0"/>
+            </a:endParaRPr>
+          </a:p>
+        </p:txBody>
+      </p:sp>
     </p:spTree>
     <p:extLst>
       <p:ext uri="{BB962C8B-B14F-4D97-AF65-F5344CB8AC3E}">

</xml_diff>

<commit_message>
#1 - worked on results and discussion
- replaced 'triangle plot' with correlation matrix
- created correlation matrix using data
- more written work
</commit_message>
<xml_diff>
--- a/physics_problem_solving/report/results/results.pptx
+++ b/physics_problem_solving/report/results/results.pptx
@@ -3786,10 +3786,10 @@
       </p:grpSpPr>
       <p:pic>
         <p:nvPicPr>
-          <p:cNvPr id="4" name="Picture 3">
-            <a:extLst>
-              <a:ext uri="{FF2B5EF4-FFF2-40B4-BE49-F238E27FC236}">
-                <a16:creationId xmlns:a16="http://schemas.microsoft.com/office/drawing/2014/main" id="{1BCA6CD7-D550-F143-A230-BDB182BCF325}"/>
+          <p:cNvPr id="35" name="Picture 34">
+            <a:extLst>
+              <a:ext uri="{FF2B5EF4-FFF2-40B4-BE49-F238E27FC236}">
+                <a16:creationId xmlns:a16="http://schemas.microsoft.com/office/drawing/2014/main" id="{690A6320-9EE7-C440-9BC2-A6E8FD664480}"/>
               </a:ext>
             </a:extLst>
           </p:cNvPr>
@@ -3800,35 +3800,6 @@
         </p:nvPicPr>
         <p:blipFill rotWithShape="1">
           <a:blip r:embed="rId3"/>
-          <a:srcRect t="10169"/>
-          <a:stretch/>
-        </p:blipFill>
-        <p:spPr>
-          <a:xfrm>
-            <a:off x="2956555" y="2910468"/>
-            <a:ext cx="3657600" cy="2464248"/>
-          </a:xfrm>
-          <a:prstGeom prst="rect">
-            <a:avLst/>
-          </a:prstGeom>
-        </p:spPr>
-      </p:pic>
-      <p:pic>
-        <p:nvPicPr>
-          <p:cNvPr id="35" name="Picture 34">
-            <a:extLst>
-              <a:ext uri="{FF2B5EF4-FFF2-40B4-BE49-F238E27FC236}">
-                <a16:creationId xmlns:a16="http://schemas.microsoft.com/office/drawing/2014/main" id="{690A6320-9EE7-C440-9BC2-A6E8FD664480}"/>
-              </a:ext>
-            </a:extLst>
-          </p:cNvPr>
-          <p:cNvPicPr>
-            <a:picLocks noChangeAspect="1"/>
-          </p:cNvPicPr>
-          <p:nvPr/>
-        </p:nvPicPr>
-        <p:blipFill rotWithShape="1">
-          <a:blip r:embed="rId4"/>
           <a:srcRect t="10426"/>
           <a:stretch/>
         </p:blipFill>
@@ -3857,7 +3828,7 @@
           <p:nvPr/>
         </p:nvPicPr>
         <p:blipFill rotWithShape="1">
-          <a:blip r:embed="rId5"/>
+          <a:blip r:embed="rId4"/>
           <a:srcRect t="10426"/>
           <a:stretch/>
         </p:blipFill>
@@ -3871,1010 +3842,1060 @@
           </a:prstGeom>
         </p:spPr>
       </p:pic>
-      <mc:AlternateContent xmlns:mc="http://schemas.openxmlformats.org/markup-compatibility/2006">
-        <mc:Choice xmlns:a14="http://schemas.microsoft.com/office/drawing/2010/main" Requires="a14">
-          <p:sp>
-            <p:nvSpPr>
-              <p:cNvPr id="5" name="TextBox 4">
-                <a:extLst>
-                  <a:ext uri="{FF2B5EF4-FFF2-40B4-BE49-F238E27FC236}">
-                    <a16:creationId xmlns:a16="http://schemas.microsoft.com/office/drawing/2014/main" id="{53386643-C5B7-CF49-87BF-F45B74C8466B}"/>
-                  </a:ext>
-                </a:extLst>
-              </p:cNvPr>
-              <p:cNvSpPr txBox="1"/>
-              <p:nvPr/>
-            </p:nvSpPr>
-            <p:spPr>
-              <a:xfrm>
-                <a:off x="3334214" y="3378818"/>
-                <a:ext cx="708848" cy="184666"/>
-              </a:xfrm>
-              <a:prstGeom prst="rect">
-                <a:avLst/>
-              </a:prstGeom>
-              <a:noFill/>
-            </p:spPr>
-            <p:txBody>
-              <a:bodyPr wrap="square" rtlCol="0">
-                <a:spAutoFit/>
-              </a:bodyPr>
-              <a:lstStyle/>
-              <a:p>
-                <a14:m>
-                  <m:oMath xmlns:m="http://schemas.openxmlformats.org/officeDocument/2006/math">
-                    <m:r>
-                      <a:rPr lang="en-GB" sz="600" b="1" i="1" smtClean="0">
-                        <a:latin typeface="Cambria Math" panose="02040503050406030204" pitchFamily="18" charset="0"/>
-                        <a:ea typeface="Cambria Math" panose="02040503050406030204" pitchFamily="18" charset="0"/>
-                        <a:cs typeface="CMU Serif Roman" panose="02000603000000000000" pitchFamily="2" charset="0"/>
-                      </a:rPr>
-                      <m:t>×</m:t>
-                    </m:r>
-                  </m:oMath>
-                </a14:m>
-                <a:r>
-                  <a:rPr lang="en-GB" sz="570" b="1" dirty="0">
+      <p:grpSp>
+        <p:nvGrpSpPr>
+          <p:cNvPr id="9" name="Group 8">
+            <a:extLst>
+              <a:ext uri="{FF2B5EF4-FFF2-40B4-BE49-F238E27FC236}">
+                <a16:creationId xmlns:a16="http://schemas.microsoft.com/office/drawing/2014/main" id="{2920687A-EEAF-2544-97CC-667AEF476419}"/>
+              </a:ext>
+            </a:extLst>
+          </p:cNvPr>
+          <p:cNvGrpSpPr/>
+          <p:nvPr/>
+        </p:nvGrpSpPr>
+        <p:grpSpPr>
+          <a:xfrm>
+            <a:off x="2893674" y="2910468"/>
+            <a:ext cx="3961354" cy="2651603"/>
+            <a:chOff x="2893674" y="2910468"/>
+            <a:chExt cx="3961354" cy="2651603"/>
+          </a:xfrm>
+        </p:grpSpPr>
+        <p:pic>
+          <p:nvPicPr>
+            <p:cNvPr id="4" name="Picture 3">
+              <a:extLst>
+                <a:ext uri="{FF2B5EF4-FFF2-40B4-BE49-F238E27FC236}">
+                  <a16:creationId xmlns:a16="http://schemas.microsoft.com/office/drawing/2014/main" id="{1BCA6CD7-D550-F143-A230-BDB182BCF325}"/>
+                </a:ext>
+              </a:extLst>
+            </p:cNvPr>
+            <p:cNvPicPr>
+              <a:picLocks noChangeAspect="1"/>
+            </p:cNvPicPr>
+            <p:nvPr/>
+          </p:nvPicPr>
+          <p:blipFill rotWithShape="1">
+            <a:blip r:embed="rId5"/>
+            <a:srcRect t="10169"/>
+            <a:stretch/>
+          </p:blipFill>
+          <p:spPr>
+            <a:xfrm>
+              <a:off x="2956555" y="2910468"/>
+              <a:ext cx="3657600" cy="2464248"/>
+            </a:xfrm>
+            <a:prstGeom prst="rect">
+              <a:avLst/>
+            </a:prstGeom>
+          </p:spPr>
+        </p:pic>
+        <mc:AlternateContent xmlns:mc="http://schemas.openxmlformats.org/markup-compatibility/2006">
+          <mc:Choice xmlns:a14="http://schemas.microsoft.com/office/drawing/2010/main" Requires="a14">
+            <p:sp>
+              <p:nvSpPr>
+                <p:cNvPr id="5" name="TextBox 4">
+                  <a:extLst>
+                    <a:ext uri="{FF2B5EF4-FFF2-40B4-BE49-F238E27FC236}">
+                      <a16:creationId xmlns:a16="http://schemas.microsoft.com/office/drawing/2014/main" id="{53386643-C5B7-CF49-87BF-F45B74C8466B}"/>
+                    </a:ext>
+                  </a:extLst>
+                </p:cNvPr>
+                <p:cNvSpPr txBox="1"/>
+                <p:nvPr/>
+              </p:nvSpPr>
+              <p:spPr>
+                <a:xfrm>
+                  <a:off x="3334214" y="3378818"/>
+                  <a:ext cx="708848" cy="184666"/>
+                </a:xfrm>
+                <a:prstGeom prst="rect">
+                  <a:avLst/>
+                </a:prstGeom>
+                <a:noFill/>
+              </p:spPr>
+              <p:txBody>
+                <a:bodyPr wrap="square" rtlCol="0">
+                  <a:spAutoFit/>
+                </a:bodyPr>
+                <a:lstStyle/>
+                <a:p>
+                  <a14:m>
+                    <m:oMath xmlns:m="http://schemas.openxmlformats.org/officeDocument/2006/math">
+                      <m:r>
+                        <a:rPr lang="en-GB" sz="600" b="1" i="1" smtClean="0">
+                          <a:latin typeface="Cambria Math" panose="02040503050406030204" pitchFamily="18" charset="0"/>
+                          <a:ea typeface="Cambria Math" panose="02040503050406030204" pitchFamily="18" charset="0"/>
+                          <a:cs typeface="CMU Serif Roman" panose="02000603000000000000" pitchFamily="2" charset="0"/>
+                        </a:rPr>
+                        <m:t>×</m:t>
+                      </m:r>
+                    </m:oMath>
+                  </a14:m>
+                  <a:r>
+                    <a:rPr lang="en-GB" sz="570" b="1" dirty="0">
+                      <a:latin typeface="CMU Serif Roman" panose="02000603000000000000" pitchFamily="2" charset="0"/>
+                      <a:ea typeface="CMU Serif Roman" panose="02000603000000000000" pitchFamily="2" charset="0"/>
+                      <a:cs typeface="CMU Serif Roman" panose="02000603000000000000" pitchFamily="2" charset="0"/>
+                    </a:rPr>
+                    <a:t>10</a:t>
+                  </a:r>
+                  <a:r>
+                    <a:rPr lang="en-GB" sz="570" b="1" baseline="30000" dirty="0">
+                      <a:latin typeface="CMU Serif Roman" panose="02000603000000000000" pitchFamily="2" charset="0"/>
+                      <a:ea typeface="CMU Serif Roman" panose="02000603000000000000" pitchFamily="2" charset="0"/>
+                      <a:cs typeface="CMU Serif Roman" panose="02000603000000000000" pitchFamily="2" charset="0"/>
+                    </a:rPr>
+                    <a:t>-5</a:t>
+                  </a:r>
+                  <a:endParaRPr lang="en-GB" sz="570" b="1" dirty="0">
                     <a:latin typeface="CMU Serif Roman" panose="02000603000000000000" pitchFamily="2" charset="0"/>
                     <a:ea typeface="CMU Serif Roman" panose="02000603000000000000" pitchFamily="2" charset="0"/>
                     <a:cs typeface="CMU Serif Roman" panose="02000603000000000000" pitchFamily="2" charset="0"/>
-                  </a:rPr>
-                  <a:t>10</a:t>
-                </a:r>
-                <a:r>
-                  <a:rPr lang="en-GB" sz="570" b="1" baseline="30000" dirty="0">
+                  </a:endParaRPr>
+                </a:p>
+              </p:txBody>
+            </p:sp>
+          </mc:Choice>
+          <mc:Fallback>
+            <p:sp>
+              <p:nvSpPr>
+                <p:cNvPr id="5" name="TextBox 4">
+                  <a:extLst>
+                    <a:ext uri="{FF2B5EF4-FFF2-40B4-BE49-F238E27FC236}">
+                      <a16:creationId xmlns:a16="http://schemas.microsoft.com/office/drawing/2014/main" id="{53386643-C5B7-CF49-87BF-F45B74C8466B}"/>
+                    </a:ext>
+                  </a:extLst>
+                </p:cNvPr>
+                <p:cNvSpPr txBox="1">
+                  <a:spLocks noRot="1" noChangeAspect="1" noMove="1" noResize="1" noEditPoints="1" noAdjustHandles="1" noChangeArrowheads="1" noChangeShapeType="1" noTextEdit="1"/>
+                </p:cNvSpPr>
+                <p:nvPr/>
+              </p:nvSpPr>
+              <p:spPr>
+                <a:xfrm>
+                  <a:off x="3334214" y="3378818"/>
+                  <a:ext cx="708848" cy="184666"/>
+                </a:xfrm>
+                <a:prstGeom prst="rect">
+                  <a:avLst/>
+                </a:prstGeom>
+                <a:blipFill>
+                  <a:blip r:embed="rId6"/>
+                  <a:stretch>
+                    <a:fillRect/>
+                  </a:stretch>
+                </a:blipFill>
+              </p:spPr>
+              <p:txBody>
+                <a:bodyPr/>
+                <a:lstStyle/>
+                <a:p>
+                  <a:r>
+                    <a:rPr lang="en-GB">
+                      <a:noFill/>
+                    </a:rPr>
+                    <a:t> </a:t>
+                  </a:r>
+                </a:p>
+              </p:txBody>
+            </p:sp>
+          </mc:Fallback>
+        </mc:AlternateContent>
+        <mc:AlternateContent xmlns:mc="http://schemas.openxmlformats.org/markup-compatibility/2006">
+          <mc:Choice xmlns:a14="http://schemas.microsoft.com/office/drawing/2010/main" Requires="a14">
+            <p:sp>
+              <p:nvSpPr>
+                <p:cNvPr id="7" name="TextBox 6">
+                  <a:extLst>
+                    <a:ext uri="{FF2B5EF4-FFF2-40B4-BE49-F238E27FC236}">
+                      <a16:creationId xmlns:a16="http://schemas.microsoft.com/office/drawing/2014/main" id="{5857D9CB-E354-D748-9081-DEB2F09607CE}"/>
+                    </a:ext>
+                  </a:extLst>
+                </p:cNvPr>
+                <p:cNvSpPr txBox="1"/>
+                <p:nvPr/>
+              </p:nvSpPr>
+              <p:spPr>
+                <a:xfrm>
+                  <a:off x="6146180" y="5224173"/>
+                  <a:ext cx="708848" cy="184666"/>
+                </a:xfrm>
+                <a:prstGeom prst="rect">
+                  <a:avLst/>
+                </a:prstGeom>
+                <a:noFill/>
+              </p:spPr>
+              <p:txBody>
+                <a:bodyPr wrap="square" rtlCol="0">
+                  <a:spAutoFit/>
+                </a:bodyPr>
+                <a:lstStyle/>
+                <a:p>
+                  <a14:m>
+                    <m:oMath xmlns:m="http://schemas.openxmlformats.org/officeDocument/2006/math">
+                      <m:r>
+                        <a:rPr lang="en-GB" sz="600" b="1" i="1" smtClean="0">
+                          <a:latin typeface="Cambria Math" panose="02040503050406030204" pitchFamily="18" charset="0"/>
+                          <a:ea typeface="Cambria Math" panose="02040503050406030204" pitchFamily="18" charset="0"/>
+                          <a:cs typeface="CMU Serif Roman" panose="02000603000000000000" pitchFamily="2" charset="0"/>
+                        </a:rPr>
+                        <m:t>×</m:t>
+                      </m:r>
+                    </m:oMath>
+                  </a14:m>
+                  <a:r>
+                    <a:rPr lang="en-GB" sz="570" b="1" dirty="0">
+                      <a:latin typeface="CMU Serif Roman" panose="02000603000000000000" pitchFamily="2" charset="0"/>
+                      <a:ea typeface="CMU Serif Roman" panose="02000603000000000000" pitchFamily="2" charset="0"/>
+                      <a:cs typeface="CMU Serif Roman" panose="02000603000000000000" pitchFamily="2" charset="0"/>
+                    </a:rPr>
+                    <a:t>10</a:t>
+                  </a:r>
+                  <a:r>
+                    <a:rPr lang="en-GB" sz="570" b="1" baseline="30000" dirty="0">
+                      <a:latin typeface="CMU Serif Roman" panose="02000603000000000000" pitchFamily="2" charset="0"/>
+                      <a:ea typeface="CMU Serif Roman" panose="02000603000000000000" pitchFamily="2" charset="0"/>
+                      <a:cs typeface="CMU Serif Roman" panose="02000603000000000000" pitchFamily="2" charset="0"/>
+                    </a:rPr>
+                    <a:t>-5</a:t>
+                  </a:r>
+                  <a:endParaRPr lang="en-GB" sz="570" b="1" dirty="0">
                     <a:latin typeface="CMU Serif Roman" panose="02000603000000000000" pitchFamily="2" charset="0"/>
                     <a:ea typeface="CMU Serif Roman" panose="02000603000000000000" pitchFamily="2" charset="0"/>
                     <a:cs typeface="CMU Serif Roman" panose="02000603000000000000" pitchFamily="2" charset="0"/>
-                  </a:rPr>
-                  <a:t>-5</a:t>
-                </a:r>
-                <a:endParaRPr lang="en-GB" sz="570" b="1" dirty="0">
+                  </a:endParaRPr>
+                </a:p>
+              </p:txBody>
+            </p:sp>
+          </mc:Choice>
+          <mc:Fallback>
+            <p:sp>
+              <p:nvSpPr>
+                <p:cNvPr id="7" name="TextBox 6">
+                  <a:extLst>
+                    <a:ext uri="{FF2B5EF4-FFF2-40B4-BE49-F238E27FC236}">
+                      <a16:creationId xmlns:a16="http://schemas.microsoft.com/office/drawing/2014/main" id="{5857D9CB-E354-D748-9081-DEB2F09607CE}"/>
+                    </a:ext>
+                  </a:extLst>
+                </p:cNvPr>
+                <p:cNvSpPr txBox="1">
+                  <a:spLocks noRot="1" noChangeAspect="1" noMove="1" noResize="1" noEditPoints="1" noAdjustHandles="1" noChangeArrowheads="1" noChangeShapeType="1" noTextEdit="1"/>
+                </p:cNvSpPr>
+                <p:nvPr/>
+              </p:nvSpPr>
+              <p:spPr>
+                <a:xfrm>
+                  <a:off x="6146180" y="5224173"/>
+                  <a:ext cx="708848" cy="184666"/>
+                </a:xfrm>
+                <a:prstGeom prst="rect">
+                  <a:avLst/>
+                </a:prstGeom>
+                <a:blipFill>
+                  <a:blip r:embed="rId7"/>
+                  <a:stretch>
+                    <a:fillRect/>
+                  </a:stretch>
+                </a:blipFill>
+              </p:spPr>
+              <p:txBody>
+                <a:bodyPr/>
+                <a:lstStyle/>
+                <a:p>
+                  <a:r>
+                    <a:rPr lang="en-GB">
+                      <a:noFill/>
+                    </a:rPr>
+                    <a:t> </a:t>
+                  </a:r>
+                </a:p>
+              </p:txBody>
+            </p:sp>
+          </mc:Fallback>
+        </mc:AlternateContent>
+        <p:sp>
+          <p:nvSpPr>
+            <p:cNvPr id="8" name="Rectangle 7">
+              <a:extLst>
+                <a:ext uri="{FF2B5EF4-FFF2-40B4-BE49-F238E27FC236}">
+                  <a16:creationId xmlns:a16="http://schemas.microsoft.com/office/drawing/2014/main" id="{8080E081-D2AA-E34E-B121-37535DEDF32D}"/>
+                </a:ext>
+              </a:extLst>
+            </p:cNvPr>
+            <p:cNvSpPr/>
+            <p:nvPr/>
+          </p:nvSpPr>
+          <p:spPr>
+            <a:xfrm>
+              <a:off x="3655983" y="5290382"/>
+              <a:ext cx="171436" cy="86090"/>
+            </a:xfrm>
+            <a:prstGeom prst="rect">
+              <a:avLst/>
+            </a:prstGeom>
+            <a:solidFill>
+              <a:schemeClr val="bg1"/>
+            </a:solidFill>
+            <a:ln>
+              <a:noFill/>
+            </a:ln>
+          </p:spPr>
+          <p:style>
+            <a:lnRef idx="2">
+              <a:schemeClr val="accent1">
+                <a:shade val="50000"/>
+              </a:schemeClr>
+            </a:lnRef>
+            <a:fillRef idx="1">
+              <a:schemeClr val="accent1"/>
+            </a:fillRef>
+            <a:effectRef idx="0">
+              <a:schemeClr val="accent1"/>
+            </a:effectRef>
+            <a:fontRef idx="minor">
+              <a:schemeClr val="lt1"/>
+            </a:fontRef>
+          </p:style>
+          <p:txBody>
+            <a:bodyPr rtlCol="0" anchor="ctr"/>
+            <a:lstStyle/>
+            <a:p>
+              <a:pPr algn="ctr"/>
+              <a:endParaRPr lang="en-GB" dirty="0"/>
+            </a:p>
+          </p:txBody>
+        </p:sp>
+        <p:sp>
+          <p:nvSpPr>
+            <p:cNvPr id="10" name="Rectangle 9">
+              <a:extLst>
+                <a:ext uri="{FF2B5EF4-FFF2-40B4-BE49-F238E27FC236}">
+                  <a16:creationId xmlns:a16="http://schemas.microsoft.com/office/drawing/2014/main" id="{63152B65-AB91-0942-8921-CE9D67F51AF8}"/>
+                </a:ext>
+              </a:extLst>
+            </p:cNvPr>
+            <p:cNvSpPr/>
+            <p:nvPr/>
+          </p:nvSpPr>
+          <p:spPr>
+            <a:xfrm>
+              <a:off x="5095075" y="5316506"/>
+              <a:ext cx="171436" cy="86090"/>
+            </a:xfrm>
+            <a:prstGeom prst="rect">
+              <a:avLst/>
+            </a:prstGeom>
+            <a:solidFill>
+              <a:schemeClr val="bg1"/>
+            </a:solidFill>
+            <a:ln>
+              <a:noFill/>
+            </a:ln>
+          </p:spPr>
+          <p:style>
+            <a:lnRef idx="2">
+              <a:schemeClr val="accent1">
+                <a:shade val="50000"/>
+              </a:schemeClr>
+            </a:lnRef>
+            <a:fillRef idx="1">
+              <a:schemeClr val="accent1"/>
+            </a:fillRef>
+            <a:effectRef idx="0">
+              <a:schemeClr val="accent1"/>
+            </a:effectRef>
+            <a:fontRef idx="minor">
+              <a:schemeClr val="lt1"/>
+            </a:fontRef>
+          </p:style>
+          <p:txBody>
+            <a:bodyPr rtlCol="0" anchor="ctr"/>
+            <a:lstStyle/>
+            <a:p>
+              <a:pPr algn="ctr"/>
+              <a:endParaRPr lang="en-GB" dirty="0"/>
+            </a:p>
+          </p:txBody>
+        </p:sp>
+        <p:sp>
+          <p:nvSpPr>
+            <p:cNvPr id="11" name="Rectangle 10">
+              <a:extLst>
+                <a:ext uri="{FF2B5EF4-FFF2-40B4-BE49-F238E27FC236}">
+                  <a16:creationId xmlns:a16="http://schemas.microsoft.com/office/drawing/2014/main" id="{6549D215-32BC-1F42-868C-AB3DF8226F14}"/>
+                </a:ext>
+              </a:extLst>
+            </p:cNvPr>
+            <p:cNvSpPr/>
+            <p:nvPr/>
+          </p:nvSpPr>
+          <p:spPr>
+            <a:xfrm>
+              <a:off x="5865935" y="5263479"/>
+              <a:ext cx="171436" cy="86090"/>
+            </a:xfrm>
+            <a:prstGeom prst="rect">
+              <a:avLst/>
+            </a:prstGeom>
+            <a:solidFill>
+              <a:schemeClr val="bg1"/>
+            </a:solidFill>
+            <a:ln>
+              <a:noFill/>
+            </a:ln>
+          </p:spPr>
+          <p:style>
+            <a:lnRef idx="2">
+              <a:schemeClr val="accent1">
+                <a:shade val="50000"/>
+              </a:schemeClr>
+            </a:lnRef>
+            <a:fillRef idx="1">
+              <a:schemeClr val="accent1"/>
+            </a:fillRef>
+            <a:effectRef idx="0">
+              <a:schemeClr val="accent1"/>
+            </a:effectRef>
+            <a:fontRef idx="minor">
+              <a:schemeClr val="lt1"/>
+            </a:fontRef>
+          </p:style>
+          <p:txBody>
+            <a:bodyPr rtlCol="0" anchor="ctr"/>
+            <a:lstStyle/>
+            <a:p>
+              <a:pPr algn="ctr"/>
+              <a:endParaRPr lang="en-GB" dirty="0"/>
+            </a:p>
+          </p:txBody>
+        </p:sp>
+        <p:sp>
+          <p:nvSpPr>
+            <p:cNvPr id="12" name="Rectangle 11">
+              <a:extLst>
+                <a:ext uri="{FF2B5EF4-FFF2-40B4-BE49-F238E27FC236}">
+                  <a16:creationId xmlns:a16="http://schemas.microsoft.com/office/drawing/2014/main" id="{47BAB0F7-905D-5845-BFA7-8D617E0C2892}"/>
+                </a:ext>
+              </a:extLst>
+            </p:cNvPr>
+            <p:cNvSpPr/>
+            <p:nvPr/>
+          </p:nvSpPr>
+          <p:spPr>
+            <a:xfrm rot="16200000">
+              <a:off x="3021027" y="4802702"/>
+              <a:ext cx="171436" cy="86090"/>
+            </a:xfrm>
+            <a:prstGeom prst="rect">
+              <a:avLst/>
+            </a:prstGeom>
+            <a:solidFill>
+              <a:schemeClr val="bg1"/>
+            </a:solidFill>
+            <a:ln>
+              <a:noFill/>
+            </a:ln>
+          </p:spPr>
+          <p:style>
+            <a:lnRef idx="2">
+              <a:schemeClr val="accent1">
+                <a:shade val="50000"/>
+              </a:schemeClr>
+            </a:lnRef>
+            <a:fillRef idx="1">
+              <a:schemeClr val="accent1"/>
+            </a:fillRef>
+            <a:effectRef idx="0">
+              <a:schemeClr val="accent1"/>
+            </a:effectRef>
+            <a:fontRef idx="minor">
+              <a:schemeClr val="lt1"/>
+            </a:fontRef>
+          </p:style>
+          <p:txBody>
+            <a:bodyPr rtlCol="0" anchor="ctr"/>
+            <a:lstStyle/>
+            <a:p>
+              <a:pPr algn="ctr"/>
+              <a:endParaRPr lang="en-GB" dirty="0"/>
+            </a:p>
+          </p:txBody>
+        </p:sp>
+        <p:sp>
+          <p:nvSpPr>
+            <p:cNvPr id="13" name="Rectangle 12">
+              <a:extLst>
+                <a:ext uri="{FF2B5EF4-FFF2-40B4-BE49-F238E27FC236}">
+                  <a16:creationId xmlns:a16="http://schemas.microsoft.com/office/drawing/2014/main" id="{0214779E-B7F1-7146-803A-C94B2480D04B}"/>
+                </a:ext>
+              </a:extLst>
+            </p:cNvPr>
+            <p:cNvSpPr/>
+            <p:nvPr/>
+          </p:nvSpPr>
+          <p:spPr>
+            <a:xfrm rot="16200000">
+              <a:off x="3064072" y="4273733"/>
+              <a:ext cx="171436" cy="86090"/>
+            </a:xfrm>
+            <a:prstGeom prst="rect">
+              <a:avLst/>
+            </a:prstGeom>
+            <a:solidFill>
+              <a:schemeClr val="bg1"/>
+            </a:solidFill>
+            <a:ln>
+              <a:noFill/>
+            </a:ln>
+          </p:spPr>
+          <p:style>
+            <a:lnRef idx="2">
+              <a:schemeClr val="accent1">
+                <a:shade val="50000"/>
+              </a:schemeClr>
+            </a:lnRef>
+            <a:fillRef idx="1">
+              <a:schemeClr val="accent1"/>
+            </a:fillRef>
+            <a:effectRef idx="0">
+              <a:schemeClr val="accent1"/>
+            </a:effectRef>
+            <a:fontRef idx="minor">
+              <a:schemeClr val="lt1"/>
+            </a:fontRef>
+          </p:style>
+          <p:txBody>
+            <a:bodyPr rtlCol="0" anchor="ctr"/>
+            <a:lstStyle/>
+            <a:p>
+              <a:pPr algn="ctr"/>
+              <a:endParaRPr lang="en-GB" dirty="0"/>
+            </a:p>
+          </p:txBody>
+        </p:sp>
+        <p:sp>
+          <p:nvSpPr>
+            <p:cNvPr id="14" name="Rectangle 13">
+              <a:extLst>
+                <a:ext uri="{FF2B5EF4-FFF2-40B4-BE49-F238E27FC236}">
+                  <a16:creationId xmlns:a16="http://schemas.microsoft.com/office/drawing/2014/main" id="{6BF1B32F-E1DE-E547-98B4-8BAD3FD42AE9}"/>
+                </a:ext>
+              </a:extLst>
+            </p:cNvPr>
+            <p:cNvSpPr/>
+            <p:nvPr/>
+          </p:nvSpPr>
+          <p:spPr>
+            <a:xfrm rot="16200000">
+              <a:off x="3021027" y="3706486"/>
+              <a:ext cx="171436" cy="86090"/>
+            </a:xfrm>
+            <a:prstGeom prst="rect">
+              <a:avLst/>
+            </a:prstGeom>
+            <a:solidFill>
+              <a:schemeClr val="bg1"/>
+            </a:solidFill>
+            <a:ln>
+              <a:noFill/>
+            </a:ln>
+          </p:spPr>
+          <p:style>
+            <a:lnRef idx="2">
+              <a:schemeClr val="accent1">
+                <a:shade val="50000"/>
+              </a:schemeClr>
+            </a:lnRef>
+            <a:fillRef idx="1">
+              <a:schemeClr val="accent1"/>
+            </a:fillRef>
+            <a:effectRef idx="0">
+              <a:schemeClr val="accent1"/>
+            </a:effectRef>
+            <a:fontRef idx="minor">
+              <a:schemeClr val="lt1"/>
+            </a:fontRef>
+          </p:style>
+          <p:txBody>
+            <a:bodyPr rtlCol="0" anchor="ctr"/>
+            <a:lstStyle/>
+            <a:p>
+              <a:pPr algn="ctr"/>
+              <a:endParaRPr lang="en-GB" dirty="0"/>
+            </a:p>
+          </p:txBody>
+        </p:sp>
+        <p:sp>
+          <p:nvSpPr>
+            <p:cNvPr id="15" name="Rectangle 14">
+              <a:extLst>
+                <a:ext uri="{FF2B5EF4-FFF2-40B4-BE49-F238E27FC236}">
+                  <a16:creationId xmlns:a16="http://schemas.microsoft.com/office/drawing/2014/main" id="{0B5B6335-25B6-5D4E-91F9-FB1D757D5E9F}"/>
+                </a:ext>
+              </a:extLst>
+            </p:cNvPr>
+            <p:cNvSpPr/>
+            <p:nvPr/>
+          </p:nvSpPr>
+          <p:spPr>
+            <a:xfrm rot="16200000">
+              <a:off x="2977982" y="3177516"/>
+              <a:ext cx="171436" cy="86090"/>
+            </a:xfrm>
+            <a:prstGeom prst="rect">
+              <a:avLst/>
+            </a:prstGeom>
+            <a:solidFill>
+              <a:schemeClr val="bg1"/>
+            </a:solidFill>
+            <a:ln>
+              <a:noFill/>
+            </a:ln>
+          </p:spPr>
+          <p:style>
+            <a:lnRef idx="2">
+              <a:schemeClr val="accent1">
+                <a:shade val="50000"/>
+              </a:schemeClr>
+            </a:lnRef>
+            <a:fillRef idx="1">
+              <a:schemeClr val="accent1"/>
+            </a:fillRef>
+            <a:effectRef idx="0">
+              <a:schemeClr val="accent1"/>
+            </a:effectRef>
+            <a:fontRef idx="minor">
+              <a:schemeClr val="lt1"/>
+            </a:fontRef>
+          </p:style>
+          <p:txBody>
+            <a:bodyPr rtlCol="0" anchor="ctr"/>
+            <a:lstStyle/>
+            <a:p>
+              <a:pPr algn="ctr"/>
+              <a:endParaRPr lang="en-GB" dirty="0"/>
+            </a:p>
+          </p:txBody>
+        </p:sp>
+        <p:sp>
+          <p:nvSpPr>
+            <p:cNvPr id="6" name="TextBox 5">
+              <a:extLst>
+                <a:ext uri="{FF2B5EF4-FFF2-40B4-BE49-F238E27FC236}">
+                  <a16:creationId xmlns:a16="http://schemas.microsoft.com/office/drawing/2014/main" id="{5FF0D894-5645-BA42-924D-1E1357A72C36}"/>
+                </a:ext>
+              </a:extLst>
+            </p:cNvPr>
+            <p:cNvSpPr txBox="1"/>
+            <p:nvPr/>
+          </p:nvSpPr>
+          <p:spPr>
+            <a:xfrm>
+              <a:off x="3553354" y="5306524"/>
+              <a:ext cx="336952" cy="246221"/>
+            </a:xfrm>
+            <a:prstGeom prst="rect">
+              <a:avLst/>
+            </a:prstGeom>
+            <a:noFill/>
+          </p:spPr>
+          <p:txBody>
+            <a:bodyPr wrap="none" rtlCol="0">
+              <a:spAutoFit/>
+            </a:bodyPr>
+            <a:lstStyle/>
+            <a:p>
+              <a:r>
+                <a:rPr lang="en-GB" sz="1000" b="1" dirty="0">
                   <a:latin typeface="CMU Serif Roman" panose="02000603000000000000" pitchFamily="2" charset="0"/>
                   <a:ea typeface="CMU Serif Roman" panose="02000603000000000000" pitchFamily="2" charset="0"/>
                   <a:cs typeface="CMU Serif Roman" panose="02000603000000000000" pitchFamily="2" charset="0"/>
-                </a:endParaRPr>
-              </a:p>
-            </p:txBody>
-          </p:sp>
-        </mc:Choice>
-        <mc:Fallback>
-          <p:sp>
-            <p:nvSpPr>
-              <p:cNvPr id="5" name="TextBox 4">
-                <a:extLst>
-                  <a:ext uri="{FF2B5EF4-FFF2-40B4-BE49-F238E27FC236}">
-                    <a16:creationId xmlns:a16="http://schemas.microsoft.com/office/drawing/2014/main" id="{53386643-C5B7-CF49-87BF-F45B74C8466B}"/>
-                  </a:ext>
-                </a:extLst>
-              </p:cNvPr>
-              <p:cNvSpPr txBox="1">
-                <a:spLocks noRot="1" noChangeAspect="1" noMove="1" noResize="1" noEditPoints="1" noAdjustHandles="1" noChangeArrowheads="1" noChangeShapeType="1" noTextEdit="1"/>
-              </p:cNvSpPr>
-              <p:nvPr/>
-            </p:nvSpPr>
-            <p:spPr>
-              <a:xfrm>
-                <a:off x="3334214" y="3378818"/>
-                <a:ext cx="708848" cy="184666"/>
-              </a:xfrm>
-              <a:prstGeom prst="rect">
-                <a:avLst/>
-              </a:prstGeom>
-              <a:blipFill>
-                <a:blip r:embed="rId6"/>
-                <a:stretch>
-                  <a:fillRect/>
-                </a:stretch>
-              </a:blipFill>
-            </p:spPr>
-            <p:txBody>
-              <a:bodyPr/>
-              <a:lstStyle/>
-              <a:p>
-                <a:r>
-                  <a:rPr lang="en-GB">
-                    <a:noFill/>
-                  </a:rPr>
-                  <a:t> </a:t>
-                </a:r>
-              </a:p>
-            </p:txBody>
-          </p:sp>
-        </mc:Fallback>
-      </mc:AlternateContent>
-      <mc:AlternateContent xmlns:mc="http://schemas.openxmlformats.org/markup-compatibility/2006">
-        <mc:Choice xmlns:a14="http://schemas.microsoft.com/office/drawing/2010/main" Requires="a14">
-          <p:sp>
-            <p:nvSpPr>
-              <p:cNvPr id="7" name="TextBox 6">
-                <a:extLst>
-                  <a:ext uri="{FF2B5EF4-FFF2-40B4-BE49-F238E27FC236}">
-                    <a16:creationId xmlns:a16="http://schemas.microsoft.com/office/drawing/2014/main" id="{5857D9CB-E354-D748-9081-DEB2F09607CE}"/>
-                  </a:ext>
-                </a:extLst>
-              </p:cNvPr>
-              <p:cNvSpPr txBox="1"/>
-              <p:nvPr/>
-            </p:nvSpPr>
-            <p:spPr>
-              <a:xfrm>
-                <a:off x="6146180" y="5224173"/>
-                <a:ext cx="708848" cy="184666"/>
-              </a:xfrm>
-              <a:prstGeom prst="rect">
-                <a:avLst/>
-              </a:prstGeom>
-              <a:noFill/>
-            </p:spPr>
-            <p:txBody>
-              <a:bodyPr wrap="square" rtlCol="0">
-                <a:spAutoFit/>
-              </a:bodyPr>
-              <a:lstStyle/>
-              <a:p>
-                <a14:m>
-                  <m:oMath xmlns:m="http://schemas.openxmlformats.org/officeDocument/2006/math">
-                    <m:r>
-                      <a:rPr lang="en-GB" sz="600" b="1" i="1" smtClean="0">
-                        <a:latin typeface="Cambria Math" panose="02040503050406030204" pitchFamily="18" charset="0"/>
-                        <a:ea typeface="Cambria Math" panose="02040503050406030204" pitchFamily="18" charset="0"/>
-                        <a:cs typeface="CMU Serif Roman" panose="02000603000000000000" pitchFamily="2" charset="0"/>
-                      </a:rPr>
-                      <m:t>×</m:t>
-                    </m:r>
-                  </m:oMath>
-                </a14:m>
-                <a:r>
-                  <a:rPr lang="en-GB" sz="570" b="1" dirty="0">
-                    <a:latin typeface="CMU Serif Roman" panose="02000603000000000000" pitchFamily="2" charset="0"/>
-                    <a:ea typeface="CMU Serif Roman" panose="02000603000000000000" pitchFamily="2" charset="0"/>
-                    <a:cs typeface="CMU Serif Roman" panose="02000603000000000000" pitchFamily="2" charset="0"/>
-                  </a:rPr>
-                  <a:t>10</a:t>
-                </a:r>
-                <a:r>
-                  <a:rPr lang="en-GB" sz="570" b="1" baseline="30000" dirty="0">
-                    <a:latin typeface="CMU Serif Roman" panose="02000603000000000000" pitchFamily="2" charset="0"/>
-                    <a:ea typeface="CMU Serif Roman" panose="02000603000000000000" pitchFamily="2" charset="0"/>
-                    <a:cs typeface="CMU Serif Roman" panose="02000603000000000000" pitchFamily="2" charset="0"/>
-                  </a:rPr>
-                  <a:t>-5</a:t>
-                </a:r>
-                <a:endParaRPr lang="en-GB" sz="570" b="1" dirty="0">
+                </a:rPr>
+                <a:t>Ω</a:t>
+              </a:r>
+              <a:r>
+                <a:rPr lang="en-GB" sz="1000" b="1" baseline="-25000" dirty="0">
                   <a:latin typeface="CMU Serif Roman" panose="02000603000000000000" pitchFamily="2" charset="0"/>
                   <a:ea typeface="CMU Serif Roman" panose="02000603000000000000" pitchFamily="2" charset="0"/>
                   <a:cs typeface="CMU Serif Roman" panose="02000603000000000000" pitchFamily="2" charset="0"/>
-                </a:endParaRPr>
-              </a:p>
-            </p:txBody>
-          </p:sp>
-        </mc:Choice>
-        <mc:Fallback>
-          <p:sp>
-            <p:nvSpPr>
-              <p:cNvPr id="7" name="TextBox 6">
-                <a:extLst>
-                  <a:ext uri="{FF2B5EF4-FFF2-40B4-BE49-F238E27FC236}">
-                    <a16:creationId xmlns:a16="http://schemas.microsoft.com/office/drawing/2014/main" id="{5857D9CB-E354-D748-9081-DEB2F09607CE}"/>
-                  </a:ext>
-                </a:extLst>
-              </p:cNvPr>
-              <p:cNvSpPr txBox="1">
-                <a:spLocks noRot="1" noChangeAspect="1" noMove="1" noResize="1" noEditPoints="1" noAdjustHandles="1" noChangeArrowheads="1" noChangeShapeType="1" noTextEdit="1"/>
-              </p:cNvSpPr>
-              <p:nvPr/>
-            </p:nvSpPr>
-            <p:spPr>
-              <a:xfrm>
-                <a:off x="6146180" y="5224173"/>
-                <a:ext cx="708848" cy="184666"/>
-              </a:xfrm>
-              <a:prstGeom prst="rect">
-                <a:avLst/>
-              </a:prstGeom>
-              <a:blipFill>
-                <a:blip r:embed="rId7"/>
-                <a:stretch>
-                  <a:fillRect/>
-                </a:stretch>
-              </a:blipFill>
-            </p:spPr>
-            <p:txBody>
-              <a:bodyPr/>
-              <a:lstStyle/>
-              <a:p>
-                <a:r>
-                  <a:rPr lang="en-GB">
-                    <a:noFill/>
-                  </a:rPr>
-                  <a:t> </a:t>
-                </a:r>
-              </a:p>
-            </p:txBody>
-          </p:sp>
-        </mc:Fallback>
-      </mc:AlternateContent>
-      <p:sp>
-        <p:nvSpPr>
-          <p:cNvPr id="8" name="Rectangle 7">
-            <a:extLst>
-              <a:ext uri="{FF2B5EF4-FFF2-40B4-BE49-F238E27FC236}">
-                <a16:creationId xmlns:a16="http://schemas.microsoft.com/office/drawing/2014/main" id="{8080E081-D2AA-E34E-B121-37535DEDF32D}"/>
-              </a:ext>
-            </a:extLst>
-          </p:cNvPr>
-          <p:cNvSpPr/>
-          <p:nvPr/>
-        </p:nvSpPr>
-        <p:spPr>
-          <a:xfrm>
-            <a:off x="3655983" y="5290382"/>
-            <a:ext cx="171436" cy="86090"/>
-          </a:xfrm>
-          <a:prstGeom prst="rect">
-            <a:avLst/>
-          </a:prstGeom>
-          <a:solidFill>
-            <a:schemeClr val="bg1"/>
-          </a:solidFill>
-          <a:ln>
-            <a:noFill/>
-          </a:ln>
-        </p:spPr>
-        <p:style>
-          <a:lnRef idx="2">
-            <a:schemeClr val="accent1">
-              <a:shade val="50000"/>
-            </a:schemeClr>
-          </a:lnRef>
-          <a:fillRef idx="1">
-            <a:schemeClr val="accent1"/>
-          </a:fillRef>
-          <a:effectRef idx="0">
-            <a:schemeClr val="accent1"/>
-          </a:effectRef>
-          <a:fontRef idx="minor">
-            <a:schemeClr val="lt1"/>
-          </a:fontRef>
-        </p:style>
-        <p:txBody>
-          <a:bodyPr rtlCol="0" anchor="ctr"/>
-          <a:lstStyle/>
-          <a:p>
-            <a:pPr algn="ctr"/>
-            <a:endParaRPr lang="en-GB" dirty="0"/>
-          </a:p>
-        </p:txBody>
-      </p:sp>
-      <p:sp>
-        <p:nvSpPr>
-          <p:cNvPr id="10" name="Rectangle 9">
-            <a:extLst>
-              <a:ext uri="{FF2B5EF4-FFF2-40B4-BE49-F238E27FC236}">
-                <a16:creationId xmlns:a16="http://schemas.microsoft.com/office/drawing/2014/main" id="{63152B65-AB91-0942-8921-CE9D67F51AF8}"/>
-              </a:ext>
-            </a:extLst>
-          </p:cNvPr>
-          <p:cNvSpPr/>
-          <p:nvPr/>
-        </p:nvSpPr>
-        <p:spPr>
-          <a:xfrm>
-            <a:off x="5095075" y="5316506"/>
-            <a:ext cx="171436" cy="86090"/>
-          </a:xfrm>
-          <a:prstGeom prst="rect">
-            <a:avLst/>
-          </a:prstGeom>
-          <a:solidFill>
-            <a:schemeClr val="bg1"/>
-          </a:solidFill>
-          <a:ln>
-            <a:noFill/>
-          </a:ln>
-        </p:spPr>
-        <p:style>
-          <a:lnRef idx="2">
-            <a:schemeClr val="accent1">
-              <a:shade val="50000"/>
-            </a:schemeClr>
-          </a:lnRef>
-          <a:fillRef idx="1">
-            <a:schemeClr val="accent1"/>
-          </a:fillRef>
-          <a:effectRef idx="0">
-            <a:schemeClr val="accent1"/>
-          </a:effectRef>
-          <a:fontRef idx="minor">
-            <a:schemeClr val="lt1"/>
-          </a:fontRef>
-        </p:style>
-        <p:txBody>
-          <a:bodyPr rtlCol="0" anchor="ctr"/>
-          <a:lstStyle/>
-          <a:p>
-            <a:pPr algn="ctr"/>
-            <a:endParaRPr lang="en-GB" dirty="0"/>
-          </a:p>
-        </p:txBody>
-      </p:sp>
-      <p:sp>
-        <p:nvSpPr>
-          <p:cNvPr id="11" name="Rectangle 10">
-            <a:extLst>
-              <a:ext uri="{FF2B5EF4-FFF2-40B4-BE49-F238E27FC236}">
-                <a16:creationId xmlns:a16="http://schemas.microsoft.com/office/drawing/2014/main" id="{6549D215-32BC-1F42-868C-AB3DF8226F14}"/>
-              </a:ext>
-            </a:extLst>
-          </p:cNvPr>
-          <p:cNvSpPr/>
-          <p:nvPr/>
-        </p:nvSpPr>
-        <p:spPr>
-          <a:xfrm>
-            <a:off x="5865935" y="5263479"/>
-            <a:ext cx="171436" cy="86090"/>
-          </a:xfrm>
-          <a:prstGeom prst="rect">
-            <a:avLst/>
-          </a:prstGeom>
-          <a:solidFill>
-            <a:schemeClr val="bg1"/>
-          </a:solidFill>
-          <a:ln>
-            <a:noFill/>
-          </a:ln>
-        </p:spPr>
-        <p:style>
-          <a:lnRef idx="2">
-            <a:schemeClr val="accent1">
-              <a:shade val="50000"/>
-            </a:schemeClr>
-          </a:lnRef>
-          <a:fillRef idx="1">
-            <a:schemeClr val="accent1"/>
-          </a:fillRef>
-          <a:effectRef idx="0">
-            <a:schemeClr val="accent1"/>
-          </a:effectRef>
-          <a:fontRef idx="minor">
-            <a:schemeClr val="lt1"/>
-          </a:fontRef>
-        </p:style>
-        <p:txBody>
-          <a:bodyPr rtlCol="0" anchor="ctr"/>
-          <a:lstStyle/>
-          <a:p>
-            <a:pPr algn="ctr"/>
-            <a:endParaRPr lang="en-GB" dirty="0"/>
-          </a:p>
-        </p:txBody>
-      </p:sp>
-      <p:sp>
-        <p:nvSpPr>
-          <p:cNvPr id="12" name="Rectangle 11">
-            <a:extLst>
-              <a:ext uri="{FF2B5EF4-FFF2-40B4-BE49-F238E27FC236}">
-                <a16:creationId xmlns:a16="http://schemas.microsoft.com/office/drawing/2014/main" id="{47BAB0F7-905D-5845-BFA7-8D617E0C2892}"/>
-              </a:ext>
-            </a:extLst>
-          </p:cNvPr>
-          <p:cNvSpPr/>
-          <p:nvPr/>
-        </p:nvSpPr>
-        <p:spPr>
-          <a:xfrm rot="16200000">
-            <a:off x="3021027" y="4802702"/>
-            <a:ext cx="171436" cy="86090"/>
-          </a:xfrm>
-          <a:prstGeom prst="rect">
-            <a:avLst/>
-          </a:prstGeom>
-          <a:solidFill>
-            <a:schemeClr val="bg1"/>
-          </a:solidFill>
-          <a:ln>
-            <a:noFill/>
-          </a:ln>
-        </p:spPr>
-        <p:style>
-          <a:lnRef idx="2">
-            <a:schemeClr val="accent1">
-              <a:shade val="50000"/>
-            </a:schemeClr>
-          </a:lnRef>
-          <a:fillRef idx="1">
-            <a:schemeClr val="accent1"/>
-          </a:fillRef>
-          <a:effectRef idx="0">
-            <a:schemeClr val="accent1"/>
-          </a:effectRef>
-          <a:fontRef idx="minor">
-            <a:schemeClr val="lt1"/>
-          </a:fontRef>
-        </p:style>
-        <p:txBody>
-          <a:bodyPr rtlCol="0" anchor="ctr"/>
-          <a:lstStyle/>
-          <a:p>
-            <a:pPr algn="ctr"/>
-            <a:endParaRPr lang="en-GB" dirty="0"/>
-          </a:p>
-        </p:txBody>
-      </p:sp>
-      <p:sp>
-        <p:nvSpPr>
-          <p:cNvPr id="13" name="Rectangle 12">
-            <a:extLst>
-              <a:ext uri="{FF2B5EF4-FFF2-40B4-BE49-F238E27FC236}">
-                <a16:creationId xmlns:a16="http://schemas.microsoft.com/office/drawing/2014/main" id="{0214779E-B7F1-7146-803A-C94B2480D04B}"/>
-              </a:ext>
-            </a:extLst>
-          </p:cNvPr>
-          <p:cNvSpPr/>
-          <p:nvPr/>
-        </p:nvSpPr>
-        <p:spPr>
-          <a:xfrm rot="16200000">
-            <a:off x="3064072" y="4273733"/>
-            <a:ext cx="171436" cy="86090"/>
-          </a:xfrm>
-          <a:prstGeom prst="rect">
-            <a:avLst/>
-          </a:prstGeom>
-          <a:solidFill>
-            <a:schemeClr val="bg1"/>
-          </a:solidFill>
-          <a:ln>
-            <a:noFill/>
-          </a:ln>
-        </p:spPr>
-        <p:style>
-          <a:lnRef idx="2">
-            <a:schemeClr val="accent1">
-              <a:shade val="50000"/>
-            </a:schemeClr>
-          </a:lnRef>
-          <a:fillRef idx="1">
-            <a:schemeClr val="accent1"/>
-          </a:fillRef>
-          <a:effectRef idx="0">
-            <a:schemeClr val="accent1"/>
-          </a:effectRef>
-          <a:fontRef idx="minor">
-            <a:schemeClr val="lt1"/>
-          </a:fontRef>
-        </p:style>
-        <p:txBody>
-          <a:bodyPr rtlCol="0" anchor="ctr"/>
-          <a:lstStyle/>
-          <a:p>
-            <a:pPr algn="ctr"/>
-            <a:endParaRPr lang="en-GB" dirty="0"/>
-          </a:p>
-        </p:txBody>
-      </p:sp>
-      <p:sp>
-        <p:nvSpPr>
-          <p:cNvPr id="14" name="Rectangle 13">
-            <a:extLst>
-              <a:ext uri="{FF2B5EF4-FFF2-40B4-BE49-F238E27FC236}">
-                <a16:creationId xmlns:a16="http://schemas.microsoft.com/office/drawing/2014/main" id="{6BF1B32F-E1DE-E547-98B4-8BAD3FD42AE9}"/>
-              </a:ext>
-            </a:extLst>
-          </p:cNvPr>
-          <p:cNvSpPr/>
-          <p:nvPr/>
-        </p:nvSpPr>
-        <p:spPr>
-          <a:xfrm rot="16200000">
-            <a:off x="3021027" y="3706486"/>
-            <a:ext cx="171436" cy="86090"/>
-          </a:xfrm>
-          <a:prstGeom prst="rect">
-            <a:avLst/>
-          </a:prstGeom>
-          <a:solidFill>
-            <a:schemeClr val="bg1"/>
-          </a:solidFill>
-          <a:ln>
-            <a:noFill/>
-          </a:ln>
-        </p:spPr>
-        <p:style>
-          <a:lnRef idx="2">
-            <a:schemeClr val="accent1">
-              <a:shade val="50000"/>
-            </a:schemeClr>
-          </a:lnRef>
-          <a:fillRef idx="1">
-            <a:schemeClr val="accent1"/>
-          </a:fillRef>
-          <a:effectRef idx="0">
-            <a:schemeClr val="accent1"/>
-          </a:effectRef>
-          <a:fontRef idx="minor">
-            <a:schemeClr val="lt1"/>
-          </a:fontRef>
-        </p:style>
-        <p:txBody>
-          <a:bodyPr rtlCol="0" anchor="ctr"/>
-          <a:lstStyle/>
-          <a:p>
-            <a:pPr algn="ctr"/>
-            <a:endParaRPr lang="en-GB" dirty="0"/>
-          </a:p>
-        </p:txBody>
-      </p:sp>
-      <p:sp>
-        <p:nvSpPr>
-          <p:cNvPr id="15" name="Rectangle 14">
-            <a:extLst>
-              <a:ext uri="{FF2B5EF4-FFF2-40B4-BE49-F238E27FC236}">
-                <a16:creationId xmlns:a16="http://schemas.microsoft.com/office/drawing/2014/main" id="{0B5B6335-25B6-5D4E-91F9-FB1D757D5E9F}"/>
-              </a:ext>
-            </a:extLst>
-          </p:cNvPr>
-          <p:cNvSpPr/>
-          <p:nvPr/>
-        </p:nvSpPr>
-        <p:spPr>
-          <a:xfrm rot="16200000">
-            <a:off x="2977982" y="3177516"/>
-            <a:ext cx="171436" cy="86090"/>
-          </a:xfrm>
-          <a:prstGeom prst="rect">
-            <a:avLst/>
-          </a:prstGeom>
-          <a:solidFill>
-            <a:schemeClr val="bg1"/>
-          </a:solidFill>
-          <a:ln>
-            <a:noFill/>
-          </a:ln>
-        </p:spPr>
-        <p:style>
-          <a:lnRef idx="2">
-            <a:schemeClr val="accent1">
-              <a:shade val="50000"/>
-            </a:schemeClr>
-          </a:lnRef>
-          <a:fillRef idx="1">
-            <a:schemeClr val="accent1"/>
-          </a:fillRef>
-          <a:effectRef idx="0">
-            <a:schemeClr val="accent1"/>
-          </a:effectRef>
-          <a:fontRef idx="minor">
-            <a:schemeClr val="lt1"/>
-          </a:fontRef>
-        </p:style>
-        <p:txBody>
-          <a:bodyPr rtlCol="0" anchor="ctr"/>
-          <a:lstStyle/>
-          <a:p>
-            <a:pPr algn="ctr"/>
-            <a:endParaRPr lang="en-GB" dirty="0"/>
-          </a:p>
-        </p:txBody>
-      </p:sp>
-      <p:sp>
-        <p:nvSpPr>
-          <p:cNvPr id="6" name="TextBox 5">
-            <a:extLst>
-              <a:ext uri="{FF2B5EF4-FFF2-40B4-BE49-F238E27FC236}">
-                <a16:creationId xmlns:a16="http://schemas.microsoft.com/office/drawing/2014/main" id="{5FF0D894-5645-BA42-924D-1E1357A72C36}"/>
-              </a:ext>
-            </a:extLst>
-          </p:cNvPr>
-          <p:cNvSpPr txBox="1"/>
-          <p:nvPr/>
-        </p:nvSpPr>
-        <p:spPr>
-          <a:xfrm>
-            <a:off x="3553354" y="5306524"/>
-            <a:ext cx="336952" cy="246221"/>
-          </a:xfrm>
-          <a:prstGeom prst="rect">
-            <a:avLst/>
-          </a:prstGeom>
-          <a:noFill/>
-        </p:spPr>
-        <p:txBody>
-          <a:bodyPr wrap="none" rtlCol="0">
-            <a:spAutoFit/>
-          </a:bodyPr>
-          <a:lstStyle/>
-          <a:p>
-            <a:r>
-              <a:rPr lang="en-GB" sz="1000" b="1" dirty="0">
+                </a:rPr>
+                <a:t>Λ</a:t>
+              </a:r>
+              <a:endParaRPr lang="en-GB" sz="1100" b="1" dirty="0">
                 <a:latin typeface="CMU Serif Roman" panose="02000603000000000000" pitchFamily="2" charset="0"/>
                 <a:ea typeface="CMU Serif Roman" panose="02000603000000000000" pitchFamily="2" charset="0"/>
                 <a:cs typeface="CMU Serif Roman" panose="02000603000000000000" pitchFamily="2" charset="0"/>
-              </a:rPr>
-              <a:t>Ω</a:t>
-            </a:r>
-            <a:r>
-              <a:rPr lang="en-GB" sz="1000" b="1" baseline="-25000" dirty="0">
+              </a:endParaRPr>
+            </a:p>
+          </p:txBody>
+        </p:sp>
+        <p:sp>
+          <p:nvSpPr>
+            <p:cNvPr id="16" name="TextBox 15">
+              <a:extLst>
+                <a:ext uri="{FF2B5EF4-FFF2-40B4-BE49-F238E27FC236}">
+                  <a16:creationId xmlns:a16="http://schemas.microsoft.com/office/drawing/2014/main" id="{E2CE5670-3D2D-1E4C-9651-FA8F6A3EBCF5}"/>
+                </a:ext>
+              </a:extLst>
+            </p:cNvPr>
+            <p:cNvSpPr txBox="1"/>
+            <p:nvPr/>
+          </p:nvSpPr>
+          <p:spPr>
+            <a:xfrm>
+              <a:off x="4327175" y="5306524"/>
+              <a:ext cx="322524" cy="246221"/>
+            </a:xfrm>
+            <a:prstGeom prst="rect">
+              <a:avLst/>
+            </a:prstGeom>
+            <a:noFill/>
+          </p:spPr>
+          <p:txBody>
+            <a:bodyPr wrap="none" rtlCol="0">
+              <a:spAutoFit/>
+            </a:bodyPr>
+            <a:lstStyle/>
+            <a:p>
+              <a:r>
+                <a:rPr lang="en-GB" sz="1000" b="1" dirty="0" err="1">
+                  <a:latin typeface="CMU Serif Roman" panose="02000603000000000000" pitchFamily="2" charset="0"/>
+                  <a:ea typeface="CMU Serif Roman" panose="02000603000000000000" pitchFamily="2" charset="0"/>
+                  <a:cs typeface="CMU Serif Roman" panose="02000603000000000000" pitchFamily="2" charset="0"/>
+                </a:rPr>
+                <a:t>Ω</a:t>
+              </a:r>
+              <a:r>
+                <a:rPr lang="en-GB" sz="1000" b="1" i="1" baseline="-25000" dirty="0" err="1">
+                  <a:latin typeface="CMU Serif Roman" panose="02000603000000000000" pitchFamily="2" charset="0"/>
+                  <a:ea typeface="CMU Serif Roman" panose="02000603000000000000" pitchFamily="2" charset="0"/>
+                  <a:cs typeface="CMU Serif Roman" panose="02000603000000000000" pitchFamily="2" charset="0"/>
+                </a:rPr>
+                <a:t>k</a:t>
+              </a:r>
+              <a:endParaRPr lang="en-GB" sz="1100" b="1" i="1" dirty="0">
                 <a:latin typeface="CMU Serif Roman" panose="02000603000000000000" pitchFamily="2" charset="0"/>
                 <a:ea typeface="CMU Serif Roman" panose="02000603000000000000" pitchFamily="2" charset="0"/>
                 <a:cs typeface="CMU Serif Roman" panose="02000603000000000000" pitchFamily="2" charset="0"/>
-              </a:rPr>
-              <a:t>Λ</a:t>
-            </a:r>
-            <a:endParaRPr lang="en-GB" sz="1100" b="1" dirty="0">
-              <a:latin typeface="CMU Serif Roman" panose="02000603000000000000" pitchFamily="2" charset="0"/>
-              <a:ea typeface="CMU Serif Roman" panose="02000603000000000000" pitchFamily="2" charset="0"/>
-              <a:cs typeface="CMU Serif Roman" panose="02000603000000000000" pitchFamily="2" charset="0"/>
-            </a:endParaRPr>
-          </a:p>
-        </p:txBody>
-      </p:sp>
-      <p:sp>
-        <p:nvSpPr>
-          <p:cNvPr id="16" name="TextBox 15">
-            <a:extLst>
-              <a:ext uri="{FF2B5EF4-FFF2-40B4-BE49-F238E27FC236}">
-                <a16:creationId xmlns:a16="http://schemas.microsoft.com/office/drawing/2014/main" id="{E2CE5670-3D2D-1E4C-9651-FA8F6A3EBCF5}"/>
-              </a:ext>
-            </a:extLst>
-          </p:cNvPr>
-          <p:cNvSpPr txBox="1"/>
-          <p:nvPr/>
-        </p:nvSpPr>
-        <p:spPr>
-          <a:xfrm>
-            <a:off x="4327175" y="5306524"/>
-            <a:ext cx="322524" cy="246221"/>
-          </a:xfrm>
-          <a:prstGeom prst="rect">
-            <a:avLst/>
-          </a:prstGeom>
-          <a:noFill/>
-        </p:spPr>
-        <p:txBody>
-          <a:bodyPr wrap="none" rtlCol="0">
-            <a:spAutoFit/>
-          </a:bodyPr>
-          <a:lstStyle/>
-          <a:p>
-            <a:r>
-              <a:rPr lang="en-GB" sz="1000" b="1" dirty="0" err="1">
+              </a:endParaRPr>
+            </a:p>
+          </p:txBody>
+        </p:sp>
+        <p:sp>
+          <p:nvSpPr>
+            <p:cNvPr id="17" name="TextBox 16">
+              <a:extLst>
+                <a:ext uri="{FF2B5EF4-FFF2-40B4-BE49-F238E27FC236}">
+                  <a16:creationId xmlns:a16="http://schemas.microsoft.com/office/drawing/2014/main" id="{F94FAA1A-F817-C742-B698-01C1115C4808}"/>
+                </a:ext>
+              </a:extLst>
+            </p:cNvPr>
+            <p:cNvSpPr txBox="1"/>
+            <p:nvPr/>
+          </p:nvSpPr>
+          <p:spPr>
+            <a:xfrm>
+              <a:off x="5025141" y="5315850"/>
+              <a:ext cx="357790" cy="246221"/>
+            </a:xfrm>
+            <a:prstGeom prst="rect">
+              <a:avLst/>
+            </a:prstGeom>
+            <a:noFill/>
+          </p:spPr>
+          <p:txBody>
+            <a:bodyPr wrap="none" rtlCol="0">
+              <a:spAutoFit/>
+            </a:bodyPr>
+            <a:lstStyle/>
+            <a:p>
+              <a:r>
+                <a:rPr lang="en-GB" sz="1000" b="1" dirty="0" err="1">
+                  <a:latin typeface="CMU Serif Roman" panose="02000603000000000000" pitchFamily="2" charset="0"/>
+                  <a:ea typeface="CMU Serif Roman" panose="02000603000000000000" pitchFamily="2" charset="0"/>
+                  <a:cs typeface="CMU Serif Roman" panose="02000603000000000000" pitchFamily="2" charset="0"/>
+                </a:rPr>
+                <a:t>Ω</a:t>
+              </a:r>
+              <a:r>
+                <a:rPr lang="en-GB" sz="1000" b="1" i="1" baseline="-25000" dirty="0" err="1">
+                  <a:latin typeface="CMU Serif Roman" panose="02000603000000000000" pitchFamily="2" charset="0"/>
+                  <a:ea typeface="CMU Serif Roman" panose="02000603000000000000" pitchFamily="2" charset="0"/>
+                  <a:cs typeface="CMU Serif Roman" panose="02000603000000000000" pitchFamily="2" charset="0"/>
+                </a:rPr>
+                <a:t>m</a:t>
+              </a:r>
+              <a:endParaRPr lang="en-GB" sz="1100" b="1" i="1" dirty="0">
                 <a:latin typeface="CMU Serif Roman" panose="02000603000000000000" pitchFamily="2" charset="0"/>
                 <a:ea typeface="CMU Serif Roman" panose="02000603000000000000" pitchFamily="2" charset="0"/>
                 <a:cs typeface="CMU Serif Roman" panose="02000603000000000000" pitchFamily="2" charset="0"/>
-              </a:rPr>
-              <a:t>Ω</a:t>
-            </a:r>
-            <a:r>
-              <a:rPr lang="en-GB" sz="1000" b="1" i="1" baseline="-25000" dirty="0" err="1">
+              </a:endParaRPr>
+            </a:p>
+          </p:txBody>
+        </p:sp>
+        <p:sp>
+          <p:nvSpPr>
+            <p:cNvPr id="18" name="TextBox 17">
+              <a:extLst>
+                <a:ext uri="{FF2B5EF4-FFF2-40B4-BE49-F238E27FC236}">
+                  <a16:creationId xmlns:a16="http://schemas.microsoft.com/office/drawing/2014/main" id="{D5E4D133-A449-AD4F-A555-A8537979510D}"/>
+                </a:ext>
+              </a:extLst>
+            </p:cNvPr>
+            <p:cNvSpPr txBox="1"/>
+            <p:nvPr/>
+          </p:nvSpPr>
+          <p:spPr>
+            <a:xfrm>
+              <a:off x="5770854" y="5312113"/>
+              <a:ext cx="320922" cy="246221"/>
+            </a:xfrm>
+            <a:prstGeom prst="rect">
+              <a:avLst/>
+            </a:prstGeom>
+            <a:noFill/>
+          </p:spPr>
+          <p:txBody>
+            <a:bodyPr wrap="none" rtlCol="0">
+              <a:spAutoFit/>
+            </a:bodyPr>
+            <a:lstStyle/>
+            <a:p>
+              <a:r>
+                <a:rPr lang="en-GB" sz="1000" b="1" dirty="0" err="1">
+                  <a:latin typeface="CMU Serif Roman" panose="02000603000000000000" pitchFamily="2" charset="0"/>
+                  <a:ea typeface="CMU Serif Roman" panose="02000603000000000000" pitchFamily="2" charset="0"/>
+                  <a:cs typeface="CMU Serif Roman" panose="02000603000000000000" pitchFamily="2" charset="0"/>
+                </a:rPr>
+                <a:t>Ω</a:t>
+              </a:r>
+              <a:r>
+                <a:rPr lang="en-GB" sz="1000" b="1" i="1" baseline="-25000" dirty="0" err="1">
+                  <a:latin typeface="CMU Serif Roman" panose="02000603000000000000" pitchFamily="2" charset="0"/>
+                  <a:ea typeface="CMU Serif Roman" panose="02000603000000000000" pitchFamily="2" charset="0"/>
+                  <a:cs typeface="CMU Serif Roman" panose="02000603000000000000" pitchFamily="2" charset="0"/>
+                </a:rPr>
+                <a:t>r</a:t>
+              </a:r>
+              <a:endParaRPr lang="en-GB" sz="1100" b="1" i="1" dirty="0">
                 <a:latin typeface="CMU Serif Roman" panose="02000603000000000000" pitchFamily="2" charset="0"/>
                 <a:ea typeface="CMU Serif Roman" panose="02000603000000000000" pitchFamily="2" charset="0"/>
                 <a:cs typeface="CMU Serif Roman" panose="02000603000000000000" pitchFamily="2" charset="0"/>
-              </a:rPr>
-              <a:t>k</a:t>
-            </a:r>
-            <a:endParaRPr lang="en-GB" sz="1100" b="1" i="1" dirty="0">
-              <a:latin typeface="CMU Serif Roman" panose="02000603000000000000" pitchFamily="2" charset="0"/>
-              <a:ea typeface="CMU Serif Roman" panose="02000603000000000000" pitchFamily="2" charset="0"/>
-              <a:cs typeface="CMU Serif Roman" panose="02000603000000000000" pitchFamily="2" charset="0"/>
-            </a:endParaRPr>
-          </a:p>
-        </p:txBody>
-      </p:sp>
-      <p:sp>
-        <p:nvSpPr>
-          <p:cNvPr id="17" name="TextBox 16">
-            <a:extLst>
-              <a:ext uri="{FF2B5EF4-FFF2-40B4-BE49-F238E27FC236}">
-                <a16:creationId xmlns:a16="http://schemas.microsoft.com/office/drawing/2014/main" id="{F94FAA1A-F817-C742-B698-01C1115C4808}"/>
-              </a:ext>
-            </a:extLst>
-          </p:cNvPr>
-          <p:cNvSpPr txBox="1"/>
-          <p:nvPr/>
-        </p:nvSpPr>
-        <p:spPr>
-          <a:xfrm>
-            <a:off x="5025141" y="5315850"/>
-            <a:ext cx="357790" cy="246221"/>
-          </a:xfrm>
-          <a:prstGeom prst="rect">
-            <a:avLst/>
-          </a:prstGeom>
-          <a:noFill/>
-        </p:spPr>
-        <p:txBody>
-          <a:bodyPr wrap="none" rtlCol="0">
-            <a:spAutoFit/>
-          </a:bodyPr>
-          <a:lstStyle/>
-          <a:p>
-            <a:r>
-              <a:rPr lang="en-GB" sz="1000" b="1" dirty="0" err="1">
+              </a:endParaRPr>
+            </a:p>
+          </p:txBody>
+        </p:sp>
+        <p:sp>
+          <p:nvSpPr>
+            <p:cNvPr id="19" name="TextBox 18">
+              <a:extLst>
+                <a:ext uri="{FF2B5EF4-FFF2-40B4-BE49-F238E27FC236}">
+                  <a16:creationId xmlns:a16="http://schemas.microsoft.com/office/drawing/2014/main" id="{804A1C1D-DCF0-F943-942C-2897DDB569AF}"/>
+                </a:ext>
+              </a:extLst>
+            </p:cNvPr>
+            <p:cNvSpPr txBox="1"/>
+            <p:nvPr/>
+          </p:nvSpPr>
+          <p:spPr>
+            <a:xfrm rot="16200000">
+              <a:off x="2792067" y="4732348"/>
+              <a:ext cx="457176" cy="246221"/>
+            </a:xfrm>
+            <a:prstGeom prst="rect">
+              <a:avLst/>
+            </a:prstGeom>
+            <a:noFill/>
+          </p:spPr>
+          <p:txBody>
+            <a:bodyPr wrap="none" rtlCol="0">
+              <a:spAutoFit/>
+            </a:bodyPr>
+            <a:lstStyle/>
+            <a:p>
+              <a:r>
+                <a:rPr lang="en-GB" sz="1000" b="1" dirty="0" err="1">
+                  <a:latin typeface="CMU Serif Roman" panose="02000603000000000000" pitchFamily="2" charset="0"/>
+                  <a:ea typeface="CMU Serif Roman" panose="02000603000000000000" pitchFamily="2" charset="0"/>
+                  <a:cs typeface="CMU Serif Roman" panose="02000603000000000000" pitchFamily="2" charset="0"/>
+                </a:rPr>
+                <a:t>L</a:t>
+              </a:r>
+              <a:r>
+                <a:rPr lang="en-GB" sz="1000" b="1" i="1" baseline="-25000" dirty="0" err="1">
+                  <a:latin typeface="CMU Serif Roman" panose="02000603000000000000" pitchFamily="2" charset="0"/>
+                  <a:ea typeface="CMU Serif Roman" panose="02000603000000000000" pitchFamily="2" charset="0"/>
+                  <a:cs typeface="CMU Serif Roman" panose="02000603000000000000" pitchFamily="2" charset="0"/>
+                </a:rPr>
+                <a:t>peak</a:t>
+              </a:r>
+              <a:endParaRPr lang="en-GB" sz="1100" b="1" i="1" dirty="0">
                 <a:latin typeface="CMU Serif Roman" panose="02000603000000000000" pitchFamily="2" charset="0"/>
                 <a:ea typeface="CMU Serif Roman" panose="02000603000000000000" pitchFamily="2" charset="0"/>
                 <a:cs typeface="CMU Serif Roman" panose="02000603000000000000" pitchFamily="2" charset="0"/>
-              </a:rPr>
-              <a:t>Ω</a:t>
-            </a:r>
-            <a:r>
-              <a:rPr lang="en-GB" sz="1000" b="1" i="1" baseline="-25000" dirty="0" err="1">
+              </a:endParaRPr>
+            </a:p>
+          </p:txBody>
+        </p:sp>
+        <p:sp>
+          <p:nvSpPr>
+            <p:cNvPr id="20" name="TextBox 19">
+              <a:extLst>
+                <a:ext uri="{FF2B5EF4-FFF2-40B4-BE49-F238E27FC236}">
+                  <a16:creationId xmlns:a16="http://schemas.microsoft.com/office/drawing/2014/main" id="{7BC8489C-7A9D-1446-90B7-D45E72801E23}"/>
+                </a:ext>
+              </a:extLst>
+            </p:cNvPr>
+            <p:cNvSpPr txBox="1"/>
+            <p:nvPr/>
+          </p:nvSpPr>
+          <p:spPr>
+            <a:xfrm rot="16200000">
+              <a:off x="2860195" y="4164532"/>
+              <a:ext cx="320922" cy="246221"/>
+            </a:xfrm>
+            <a:prstGeom prst="rect">
+              <a:avLst/>
+            </a:prstGeom>
+            <a:noFill/>
+          </p:spPr>
+          <p:txBody>
+            <a:bodyPr wrap="none" rtlCol="0">
+              <a:spAutoFit/>
+            </a:bodyPr>
+            <a:lstStyle/>
+            <a:p>
+              <a:r>
+                <a:rPr lang="en-GB" sz="1000" b="1" dirty="0" err="1">
+                  <a:latin typeface="CMU Serif Roman" panose="02000603000000000000" pitchFamily="2" charset="0"/>
+                  <a:ea typeface="CMU Serif Roman" panose="02000603000000000000" pitchFamily="2" charset="0"/>
+                  <a:cs typeface="CMU Serif Roman" panose="02000603000000000000" pitchFamily="2" charset="0"/>
+                </a:rPr>
+                <a:t>Ω</a:t>
+              </a:r>
+              <a:r>
+                <a:rPr lang="en-GB" sz="1000" b="1" i="1" baseline="-25000" dirty="0" err="1">
+                  <a:latin typeface="CMU Serif Roman" panose="02000603000000000000" pitchFamily="2" charset="0"/>
+                  <a:ea typeface="CMU Serif Roman" panose="02000603000000000000" pitchFamily="2" charset="0"/>
+                  <a:cs typeface="CMU Serif Roman" panose="02000603000000000000" pitchFamily="2" charset="0"/>
+                </a:rPr>
+                <a:t>r</a:t>
+              </a:r>
+              <a:endParaRPr lang="en-GB" sz="1100" b="1" i="1" dirty="0">
                 <a:latin typeface="CMU Serif Roman" panose="02000603000000000000" pitchFamily="2" charset="0"/>
                 <a:ea typeface="CMU Serif Roman" panose="02000603000000000000" pitchFamily="2" charset="0"/>
                 <a:cs typeface="CMU Serif Roman" panose="02000603000000000000" pitchFamily="2" charset="0"/>
-              </a:rPr>
-              <a:t>m</a:t>
-            </a:r>
-            <a:endParaRPr lang="en-GB" sz="1100" b="1" i="1" dirty="0">
-              <a:latin typeface="CMU Serif Roman" panose="02000603000000000000" pitchFamily="2" charset="0"/>
-              <a:ea typeface="CMU Serif Roman" panose="02000603000000000000" pitchFamily="2" charset="0"/>
-              <a:cs typeface="CMU Serif Roman" panose="02000603000000000000" pitchFamily="2" charset="0"/>
-            </a:endParaRPr>
-          </a:p>
-        </p:txBody>
-      </p:sp>
-      <p:sp>
-        <p:nvSpPr>
-          <p:cNvPr id="18" name="TextBox 17">
-            <a:extLst>
-              <a:ext uri="{FF2B5EF4-FFF2-40B4-BE49-F238E27FC236}">
-                <a16:creationId xmlns:a16="http://schemas.microsoft.com/office/drawing/2014/main" id="{D5E4D133-A449-AD4F-A555-A8537979510D}"/>
-              </a:ext>
-            </a:extLst>
-          </p:cNvPr>
-          <p:cNvSpPr txBox="1"/>
-          <p:nvPr/>
-        </p:nvSpPr>
-        <p:spPr>
-          <a:xfrm>
-            <a:off x="5770854" y="5312113"/>
-            <a:ext cx="320922" cy="246221"/>
-          </a:xfrm>
-          <a:prstGeom prst="rect">
-            <a:avLst/>
-          </a:prstGeom>
-          <a:noFill/>
-        </p:spPr>
-        <p:txBody>
-          <a:bodyPr wrap="none" rtlCol="0">
-            <a:spAutoFit/>
-          </a:bodyPr>
-          <a:lstStyle/>
-          <a:p>
-            <a:r>
-              <a:rPr lang="en-GB" sz="1000" b="1" dirty="0" err="1">
+              </a:endParaRPr>
+            </a:p>
+          </p:txBody>
+        </p:sp>
+        <p:sp>
+          <p:nvSpPr>
+            <p:cNvPr id="21" name="TextBox 20">
+              <a:extLst>
+                <a:ext uri="{FF2B5EF4-FFF2-40B4-BE49-F238E27FC236}">
+                  <a16:creationId xmlns:a16="http://schemas.microsoft.com/office/drawing/2014/main" id="{E4F5C7E7-5CFC-7748-88EF-5EE894FDF23D}"/>
+                </a:ext>
+              </a:extLst>
+            </p:cNvPr>
+            <p:cNvSpPr txBox="1"/>
+            <p:nvPr/>
+          </p:nvSpPr>
+          <p:spPr>
+            <a:xfrm rot="16200000">
+              <a:off x="2837890" y="3646409"/>
+              <a:ext cx="357790" cy="246221"/>
+            </a:xfrm>
+            <a:prstGeom prst="rect">
+              <a:avLst/>
+            </a:prstGeom>
+            <a:noFill/>
+          </p:spPr>
+          <p:txBody>
+            <a:bodyPr wrap="none" rtlCol="0">
+              <a:spAutoFit/>
+            </a:bodyPr>
+            <a:lstStyle/>
+            <a:p>
+              <a:r>
+                <a:rPr lang="en-GB" sz="1000" b="1" dirty="0" err="1">
+                  <a:latin typeface="CMU Serif Roman" panose="02000603000000000000" pitchFamily="2" charset="0"/>
+                  <a:ea typeface="CMU Serif Roman" panose="02000603000000000000" pitchFamily="2" charset="0"/>
+                  <a:cs typeface="CMU Serif Roman" panose="02000603000000000000" pitchFamily="2" charset="0"/>
+                </a:rPr>
+                <a:t>Ω</a:t>
+              </a:r>
+              <a:r>
+                <a:rPr lang="en-GB" sz="1000" b="1" i="1" baseline="-25000" dirty="0" err="1">
+                  <a:latin typeface="CMU Serif Roman" panose="02000603000000000000" pitchFamily="2" charset="0"/>
+                  <a:ea typeface="CMU Serif Roman" panose="02000603000000000000" pitchFamily="2" charset="0"/>
+                  <a:cs typeface="CMU Serif Roman" panose="02000603000000000000" pitchFamily="2" charset="0"/>
+                </a:rPr>
+                <a:t>m</a:t>
+              </a:r>
+              <a:endParaRPr lang="en-GB" sz="1100" b="1" i="1" dirty="0">
                 <a:latin typeface="CMU Serif Roman" panose="02000603000000000000" pitchFamily="2" charset="0"/>
                 <a:ea typeface="CMU Serif Roman" panose="02000603000000000000" pitchFamily="2" charset="0"/>
                 <a:cs typeface="CMU Serif Roman" panose="02000603000000000000" pitchFamily="2" charset="0"/>
-              </a:rPr>
-              <a:t>Ω</a:t>
-            </a:r>
-            <a:r>
-              <a:rPr lang="en-GB" sz="1000" b="1" i="1" baseline="-25000" dirty="0" err="1">
+              </a:endParaRPr>
+            </a:p>
+          </p:txBody>
+        </p:sp>
+        <p:sp>
+          <p:nvSpPr>
+            <p:cNvPr id="22" name="TextBox 21">
+              <a:extLst>
+                <a:ext uri="{FF2B5EF4-FFF2-40B4-BE49-F238E27FC236}">
+                  <a16:creationId xmlns:a16="http://schemas.microsoft.com/office/drawing/2014/main" id="{DD1838A6-28C0-0F42-AC9B-CF7824A4A512}"/>
+                </a:ext>
+              </a:extLst>
+            </p:cNvPr>
+            <p:cNvSpPr txBox="1"/>
+            <p:nvPr/>
+          </p:nvSpPr>
+          <p:spPr>
+            <a:xfrm rot="16200000">
+              <a:off x="2865418" y="3089430"/>
+              <a:ext cx="322524" cy="246221"/>
+            </a:xfrm>
+            <a:prstGeom prst="rect">
+              <a:avLst/>
+            </a:prstGeom>
+            <a:noFill/>
+          </p:spPr>
+          <p:txBody>
+            <a:bodyPr wrap="none" rtlCol="0">
+              <a:spAutoFit/>
+            </a:bodyPr>
+            <a:lstStyle/>
+            <a:p>
+              <a:r>
+                <a:rPr lang="en-GB" sz="1000" b="1" dirty="0" err="1">
+                  <a:latin typeface="CMU Serif Roman" panose="02000603000000000000" pitchFamily="2" charset="0"/>
+                  <a:ea typeface="CMU Serif Roman" panose="02000603000000000000" pitchFamily="2" charset="0"/>
+                  <a:cs typeface="CMU Serif Roman" panose="02000603000000000000" pitchFamily="2" charset="0"/>
+                </a:rPr>
+                <a:t>Ω</a:t>
+              </a:r>
+              <a:r>
+                <a:rPr lang="en-GB" sz="1000" b="1" i="1" baseline="-25000" dirty="0" err="1">
+                  <a:latin typeface="CMU Serif Roman" panose="02000603000000000000" pitchFamily="2" charset="0"/>
+                  <a:ea typeface="CMU Serif Roman" panose="02000603000000000000" pitchFamily="2" charset="0"/>
+                  <a:cs typeface="CMU Serif Roman" panose="02000603000000000000" pitchFamily="2" charset="0"/>
+                </a:rPr>
+                <a:t>k</a:t>
+              </a:r>
+              <a:endParaRPr lang="en-GB" sz="1100" b="1" i="1" dirty="0">
                 <a:latin typeface="CMU Serif Roman" panose="02000603000000000000" pitchFamily="2" charset="0"/>
                 <a:ea typeface="CMU Serif Roman" panose="02000603000000000000" pitchFamily="2" charset="0"/>
                 <a:cs typeface="CMU Serif Roman" panose="02000603000000000000" pitchFamily="2" charset="0"/>
-              </a:rPr>
-              <a:t>r</a:t>
-            </a:r>
-            <a:endParaRPr lang="en-GB" sz="1100" b="1" i="1" dirty="0">
-              <a:latin typeface="CMU Serif Roman" panose="02000603000000000000" pitchFamily="2" charset="0"/>
-              <a:ea typeface="CMU Serif Roman" panose="02000603000000000000" pitchFamily="2" charset="0"/>
-              <a:cs typeface="CMU Serif Roman" panose="02000603000000000000" pitchFamily="2" charset="0"/>
-            </a:endParaRPr>
-          </a:p>
-        </p:txBody>
-      </p:sp>
-      <p:sp>
-        <p:nvSpPr>
-          <p:cNvPr id="19" name="TextBox 18">
-            <a:extLst>
-              <a:ext uri="{FF2B5EF4-FFF2-40B4-BE49-F238E27FC236}">
-                <a16:creationId xmlns:a16="http://schemas.microsoft.com/office/drawing/2014/main" id="{804A1C1D-DCF0-F943-942C-2897DDB569AF}"/>
-              </a:ext>
-            </a:extLst>
-          </p:cNvPr>
-          <p:cNvSpPr txBox="1"/>
-          <p:nvPr/>
-        </p:nvSpPr>
-        <p:spPr>
-          <a:xfrm rot="16200000">
-            <a:off x="2792067" y="4732348"/>
-            <a:ext cx="457176" cy="246221"/>
-          </a:xfrm>
-          <a:prstGeom prst="rect">
-            <a:avLst/>
-          </a:prstGeom>
-          <a:noFill/>
-        </p:spPr>
-        <p:txBody>
-          <a:bodyPr wrap="none" rtlCol="0">
-            <a:spAutoFit/>
-          </a:bodyPr>
-          <a:lstStyle/>
-          <a:p>
-            <a:r>
-              <a:rPr lang="en-GB" sz="1000" b="1" dirty="0" err="1">
-                <a:latin typeface="CMU Serif Roman" panose="02000603000000000000" pitchFamily="2" charset="0"/>
-                <a:ea typeface="CMU Serif Roman" panose="02000603000000000000" pitchFamily="2" charset="0"/>
-                <a:cs typeface="CMU Serif Roman" panose="02000603000000000000" pitchFamily="2" charset="0"/>
-              </a:rPr>
-              <a:t>L</a:t>
-            </a:r>
-            <a:r>
-              <a:rPr lang="en-GB" sz="1000" b="1" i="1" baseline="-25000" dirty="0" err="1">
-                <a:latin typeface="CMU Serif Roman" panose="02000603000000000000" pitchFamily="2" charset="0"/>
-                <a:ea typeface="CMU Serif Roman" panose="02000603000000000000" pitchFamily="2" charset="0"/>
-                <a:cs typeface="CMU Serif Roman" panose="02000603000000000000" pitchFamily="2" charset="0"/>
-              </a:rPr>
-              <a:t>peak</a:t>
-            </a:r>
-            <a:endParaRPr lang="en-GB" sz="1100" b="1" i="1" dirty="0">
-              <a:latin typeface="CMU Serif Roman" panose="02000603000000000000" pitchFamily="2" charset="0"/>
-              <a:ea typeface="CMU Serif Roman" panose="02000603000000000000" pitchFamily="2" charset="0"/>
-              <a:cs typeface="CMU Serif Roman" panose="02000603000000000000" pitchFamily="2" charset="0"/>
-            </a:endParaRPr>
-          </a:p>
-        </p:txBody>
-      </p:sp>
-      <p:sp>
-        <p:nvSpPr>
-          <p:cNvPr id="20" name="TextBox 19">
-            <a:extLst>
-              <a:ext uri="{FF2B5EF4-FFF2-40B4-BE49-F238E27FC236}">
-                <a16:creationId xmlns:a16="http://schemas.microsoft.com/office/drawing/2014/main" id="{7BC8489C-7A9D-1446-90B7-D45E72801E23}"/>
-              </a:ext>
-            </a:extLst>
-          </p:cNvPr>
-          <p:cNvSpPr txBox="1"/>
-          <p:nvPr/>
-        </p:nvSpPr>
-        <p:spPr>
-          <a:xfrm rot="16200000">
-            <a:off x="2860195" y="4164532"/>
-            <a:ext cx="320922" cy="246221"/>
-          </a:xfrm>
-          <a:prstGeom prst="rect">
-            <a:avLst/>
-          </a:prstGeom>
-          <a:noFill/>
-        </p:spPr>
-        <p:txBody>
-          <a:bodyPr wrap="none" rtlCol="0">
-            <a:spAutoFit/>
-          </a:bodyPr>
-          <a:lstStyle/>
-          <a:p>
-            <a:r>
-              <a:rPr lang="en-GB" sz="1000" b="1" dirty="0" err="1">
-                <a:latin typeface="CMU Serif Roman" panose="02000603000000000000" pitchFamily="2" charset="0"/>
-                <a:ea typeface="CMU Serif Roman" panose="02000603000000000000" pitchFamily="2" charset="0"/>
-                <a:cs typeface="CMU Serif Roman" panose="02000603000000000000" pitchFamily="2" charset="0"/>
-              </a:rPr>
-              <a:t>Ω</a:t>
-            </a:r>
-            <a:r>
-              <a:rPr lang="en-GB" sz="1000" b="1" i="1" baseline="-25000" dirty="0" err="1">
-                <a:latin typeface="CMU Serif Roman" panose="02000603000000000000" pitchFamily="2" charset="0"/>
-                <a:ea typeface="CMU Serif Roman" panose="02000603000000000000" pitchFamily="2" charset="0"/>
-                <a:cs typeface="CMU Serif Roman" panose="02000603000000000000" pitchFamily="2" charset="0"/>
-              </a:rPr>
-              <a:t>r</a:t>
-            </a:r>
-            <a:endParaRPr lang="en-GB" sz="1100" b="1" i="1" dirty="0">
-              <a:latin typeface="CMU Serif Roman" panose="02000603000000000000" pitchFamily="2" charset="0"/>
-              <a:ea typeface="CMU Serif Roman" panose="02000603000000000000" pitchFamily="2" charset="0"/>
-              <a:cs typeface="CMU Serif Roman" panose="02000603000000000000" pitchFamily="2" charset="0"/>
-            </a:endParaRPr>
-          </a:p>
-        </p:txBody>
-      </p:sp>
-      <p:sp>
-        <p:nvSpPr>
-          <p:cNvPr id="21" name="TextBox 20">
-            <a:extLst>
-              <a:ext uri="{FF2B5EF4-FFF2-40B4-BE49-F238E27FC236}">
-                <a16:creationId xmlns:a16="http://schemas.microsoft.com/office/drawing/2014/main" id="{E4F5C7E7-5CFC-7748-88EF-5EE894FDF23D}"/>
-              </a:ext>
-            </a:extLst>
-          </p:cNvPr>
-          <p:cNvSpPr txBox="1"/>
-          <p:nvPr/>
-        </p:nvSpPr>
-        <p:spPr>
-          <a:xfrm rot="16200000">
-            <a:off x="2837890" y="3646409"/>
-            <a:ext cx="357790" cy="246221"/>
-          </a:xfrm>
-          <a:prstGeom prst="rect">
-            <a:avLst/>
-          </a:prstGeom>
-          <a:noFill/>
-        </p:spPr>
-        <p:txBody>
-          <a:bodyPr wrap="none" rtlCol="0">
-            <a:spAutoFit/>
-          </a:bodyPr>
-          <a:lstStyle/>
-          <a:p>
-            <a:r>
-              <a:rPr lang="en-GB" sz="1000" b="1" dirty="0" err="1">
-                <a:latin typeface="CMU Serif Roman" panose="02000603000000000000" pitchFamily="2" charset="0"/>
-                <a:ea typeface="CMU Serif Roman" panose="02000603000000000000" pitchFamily="2" charset="0"/>
-                <a:cs typeface="CMU Serif Roman" panose="02000603000000000000" pitchFamily="2" charset="0"/>
-              </a:rPr>
-              <a:t>Ω</a:t>
-            </a:r>
-            <a:r>
-              <a:rPr lang="en-GB" sz="1000" b="1" i="1" baseline="-25000" dirty="0" err="1">
-                <a:latin typeface="CMU Serif Roman" panose="02000603000000000000" pitchFamily="2" charset="0"/>
-                <a:ea typeface="CMU Serif Roman" panose="02000603000000000000" pitchFamily="2" charset="0"/>
-                <a:cs typeface="CMU Serif Roman" panose="02000603000000000000" pitchFamily="2" charset="0"/>
-              </a:rPr>
-              <a:t>m</a:t>
-            </a:r>
-            <a:endParaRPr lang="en-GB" sz="1100" b="1" i="1" dirty="0">
-              <a:latin typeface="CMU Serif Roman" panose="02000603000000000000" pitchFamily="2" charset="0"/>
-              <a:ea typeface="CMU Serif Roman" panose="02000603000000000000" pitchFamily="2" charset="0"/>
-              <a:cs typeface="CMU Serif Roman" panose="02000603000000000000" pitchFamily="2" charset="0"/>
-            </a:endParaRPr>
-          </a:p>
-        </p:txBody>
-      </p:sp>
-      <p:sp>
-        <p:nvSpPr>
-          <p:cNvPr id="22" name="TextBox 21">
-            <a:extLst>
-              <a:ext uri="{FF2B5EF4-FFF2-40B4-BE49-F238E27FC236}">
-                <a16:creationId xmlns:a16="http://schemas.microsoft.com/office/drawing/2014/main" id="{DD1838A6-28C0-0F42-AC9B-CF7824A4A512}"/>
-              </a:ext>
-            </a:extLst>
-          </p:cNvPr>
-          <p:cNvSpPr txBox="1"/>
-          <p:nvPr/>
-        </p:nvSpPr>
-        <p:spPr>
-          <a:xfrm rot="16200000">
-            <a:off x="2865418" y="3089430"/>
-            <a:ext cx="322524" cy="246221"/>
-          </a:xfrm>
-          <a:prstGeom prst="rect">
-            <a:avLst/>
-          </a:prstGeom>
-          <a:noFill/>
-        </p:spPr>
-        <p:txBody>
-          <a:bodyPr wrap="none" rtlCol="0">
-            <a:spAutoFit/>
-          </a:bodyPr>
-          <a:lstStyle/>
-          <a:p>
-            <a:r>
-              <a:rPr lang="en-GB" sz="1000" b="1" dirty="0" err="1">
-                <a:latin typeface="CMU Serif Roman" panose="02000603000000000000" pitchFamily="2" charset="0"/>
-                <a:ea typeface="CMU Serif Roman" panose="02000603000000000000" pitchFamily="2" charset="0"/>
-                <a:cs typeface="CMU Serif Roman" panose="02000603000000000000" pitchFamily="2" charset="0"/>
-              </a:rPr>
-              <a:t>Ω</a:t>
-            </a:r>
-            <a:r>
-              <a:rPr lang="en-GB" sz="1000" b="1" i="1" baseline="-25000" dirty="0" err="1">
-                <a:latin typeface="CMU Serif Roman" panose="02000603000000000000" pitchFamily="2" charset="0"/>
-                <a:ea typeface="CMU Serif Roman" panose="02000603000000000000" pitchFamily="2" charset="0"/>
-                <a:cs typeface="CMU Serif Roman" panose="02000603000000000000" pitchFamily="2" charset="0"/>
-              </a:rPr>
-              <a:t>k</a:t>
-            </a:r>
-            <a:endParaRPr lang="en-GB" sz="1100" b="1" i="1" dirty="0">
-              <a:latin typeface="CMU Serif Roman" panose="02000603000000000000" pitchFamily="2" charset="0"/>
-              <a:ea typeface="CMU Serif Roman" panose="02000603000000000000" pitchFamily="2" charset="0"/>
-              <a:cs typeface="CMU Serif Roman" panose="02000603000000000000" pitchFamily="2" charset="0"/>
-            </a:endParaRPr>
-          </a:p>
-        </p:txBody>
-      </p:sp>
+              </a:endParaRPr>
+            </a:p>
+          </p:txBody>
+        </p:sp>
+      </p:grpSp>
     </p:spTree>
     <p:extLst>
       <p:ext uri="{BB962C8B-B14F-4D97-AF65-F5344CB8AC3E}">

</xml_diff>